<commit_message>
add repair ppt ch1
</commit_message>
<xml_diff>
--- a/国科大经典版PPT模板（16：9）.pptx
+++ b/国科大经典版PPT模板（16：9）.pptx
@@ -1,22 +1,25 @@
 
 <file path=ppt/presentation.xml><?xml version="1.0" encoding="utf-8"?>
-<p:presentation xmlns:a="http://schemas.openxmlformats.org/drawingml/2006/main" xmlns:r="http://schemas.openxmlformats.org/officeDocument/2006/relationships" xmlns:p="http://schemas.openxmlformats.org/presentationml/2006/main" saveSubsetFonts="1">
+<p:presentation xmlns:a="http://schemas.openxmlformats.org/drawingml/2006/main" xmlns:r="http://schemas.openxmlformats.org/officeDocument/2006/relationships" xmlns:p="http://schemas.openxmlformats.org/presentationml/2006/main">
   <p:sldMasterIdLst>
-    <p:sldMasterId id="2147483660" r:id="rId1"/>
+    <p:sldMasterId id="2147483648" r:id="rId1"/>
   </p:sldMasterIdLst>
   <p:notesMasterIdLst>
-    <p:notesMasterId r:id="rId8"/>
+    <p:notesMasterId r:id="rId4"/>
   </p:notesMasterIdLst>
   <p:sldIdLst>
-    <p:sldId id="257" r:id="rId2"/>
-    <p:sldId id="263" r:id="rId3"/>
-    <p:sldId id="265" r:id="rId4"/>
-    <p:sldId id="267" r:id="rId5"/>
-    <p:sldId id="268" r:id="rId6"/>
-    <p:sldId id="266" r:id="rId7"/>
+    <p:sldId id="257" r:id="rId3"/>
+    <p:sldId id="263" r:id="rId5"/>
+    <p:sldId id="265" r:id="rId6"/>
+    <p:sldId id="267" r:id="rId7"/>
+    <p:sldId id="268" r:id="rId8"/>
+    <p:sldId id="266" r:id="rId9"/>
   </p:sldIdLst>
   <p:sldSz cx="12192000" cy="6858000"/>
   <p:notesSz cx="6858000" cy="9144000"/>
+  <p:custDataLst>
+    <p:tags r:id="rId13"/>
+  </p:custDataLst>
   <p:defaultTextStyle>
     <a:defPPr>
       <a:defRPr lang="zh-CN"/>
@@ -132,7 +135,7 @@
 </file>
 
 <file path=ppt/charts/chart1.xml><?xml version="1.0" encoding="utf-8"?>
-<c:chartSpace xmlns:c="http://schemas.openxmlformats.org/drawingml/2006/chart" xmlns:a="http://schemas.openxmlformats.org/drawingml/2006/main" xmlns:r="http://schemas.openxmlformats.org/officeDocument/2006/relationships" xmlns:c16r2="http://schemas.microsoft.com/office/drawing/2015/06/chart">
+<c:chartSpace xmlns:c="http://schemas.openxmlformats.org/drawingml/2006/chart" xmlns:a="http://schemas.openxmlformats.org/drawingml/2006/main" xmlns:r="http://schemas.openxmlformats.org/officeDocument/2006/relationships">
   <c:date1904 val="0"/>
   <c:lang val="zh-CN"/>
   <c:roundedCorners val="0"/>
@@ -146,6 +149,7 @@
   </mc:AlternateContent>
   <c:chart>
     <c:title>
+      <c:layout/>
       <c:overlay val="0"/>
       <c:spPr>
         <a:noFill/>
@@ -159,7 +163,7 @@
         <a:lstStyle/>
         <a:p>
           <a:pPr>
-            <a:defRPr sz="2128" b="1" i="0" u="none" strike="noStrike" kern="1200" baseline="0">
+            <a:defRPr lang="zh-CN" sz="2130" b="1" i="0" u="none" strike="noStrike" kern="1200" baseline="0">
               <a:solidFill>
                 <a:schemeClr val="tx2"/>
               </a:solidFill>
@@ -168,7 +172,6 @@
               <a:cs typeface="+mn-cs"/>
             </a:defRPr>
           </a:pPr>
-          <a:endParaRPr lang="zh-CN"/>
         </a:p>
       </c:txPr>
     </c:title>
@@ -226,6 +229,9 @@
             <a:effectLst/>
           </c:spPr>
           <c:invertIfNegative val="0"/>
+          <c:dLbls>
+            <c:delete val="1"/>
+          </c:dLbls>
           <c:cat>
             <c:strRef>
               <c:f>Sheet1!$A$2:$A$5</c:f>
@@ -267,11 +273,6 @@
               </c:numCache>
             </c:numRef>
           </c:val>
-          <c:extLst>
-            <c:ext xmlns:c16="http://schemas.microsoft.com/office/drawing/2014/chart" uri="{C3380CC4-5D6E-409C-BE32-E72D297353CC}">
-              <c16:uniqueId val="{00000000-D3BB-4C63-AA99-10D830F6E98F}"/>
-            </c:ext>
-          </c:extLst>
         </c:ser>
         <c:ser>
           <c:idx val="1"/>
@@ -320,6 +321,9 @@
             <a:effectLst/>
           </c:spPr>
           <c:invertIfNegative val="0"/>
+          <c:dLbls>
+            <c:delete val="1"/>
+          </c:dLbls>
           <c:cat>
             <c:strRef>
               <c:f>Sheet1!$A$2:$A$5</c:f>
@@ -350,7 +354,7 @@
                   <c:v>2.4</c:v>
                 </c:pt>
                 <c:pt idx="1">
-                  <c:v>4.4000000000000004</c:v>
+                  <c:v>4.4</c:v>
                 </c:pt>
                 <c:pt idx="2">
                   <c:v>1.8</c:v>
@@ -361,11 +365,6 @@
               </c:numCache>
             </c:numRef>
           </c:val>
-          <c:extLst>
-            <c:ext xmlns:c16="http://schemas.microsoft.com/office/drawing/2014/chart" uri="{C3380CC4-5D6E-409C-BE32-E72D297353CC}">
-              <c16:uniqueId val="{00000001-D3BB-4C63-AA99-10D830F6E98F}"/>
-            </c:ext>
-          </c:extLst>
         </c:ser>
         <c:ser>
           <c:idx val="2"/>
@@ -414,6 +413,9 @@
             <a:effectLst/>
           </c:spPr>
           <c:invertIfNegative val="0"/>
+          <c:dLbls>
+            <c:delete val="1"/>
+          </c:dLbls>
           <c:cat>
             <c:strRef>
               <c:f>Sheet1!$A$2:$A$5</c:f>
@@ -455,11 +457,6 @@
               </c:numCache>
             </c:numRef>
           </c:val>
-          <c:extLst>
-            <c:ext xmlns:c16="http://schemas.microsoft.com/office/drawing/2014/chart" uri="{C3380CC4-5D6E-409C-BE32-E72D297353CC}">
-              <c16:uniqueId val="{00000002-D3BB-4C63-AA99-10D830F6E98F}"/>
-            </c:ext>
-          </c:extLst>
         </c:ser>
         <c:dLbls>
           <c:showLegendKey val="0"/>
@@ -503,7 +500,7 @@
           <a:lstStyle/>
           <a:p>
             <a:pPr>
-              <a:defRPr sz="1197" b="0" i="0" u="none" strike="noStrike" kern="1200" baseline="0">
+              <a:defRPr lang="zh-CN" sz="1195" b="0" i="0" u="none" strike="noStrike" kern="1200" baseline="0">
                 <a:solidFill>
                   <a:schemeClr val="tx2"/>
                 </a:solidFill>
@@ -512,7 +509,6 @@
                 <a:cs typeface="+mn-cs"/>
               </a:defRPr>
             </a:pPr>
-            <a:endParaRPr lang="zh-CN"/>
           </a:p>
         </c:txPr>
         <c:crossAx val="1079578960"/>
@@ -559,7 +555,7 @@
           <a:lstStyle/>
           <a:p>
             <a:pPr>
-              <a:defRPr sz="1197" b="0" i="0" u="none" strike="noStrike" kern="1200" baseline="0">
+              <a:defRPr lang="zh-CN" sz="1195" b="0" i="0" u="none" strike="noStrike" kern="1200" baseline="0">
                 <a:solidFill>
                   <a:schemeClr val="tx2"/>
                 </a:solidFill>
@@ -568,7 +564,6 @@
                 <a:cs typeface="+mn-cs"/>
               </a:defRPr>
             </a:pPr>
-            <a:endParaRPr lang="zh-CN"/>
           </a:p>
         </c:txPr>
         <c:crossAx val="1079583952"/>
@@ -585,6 +580,7 @@
     </c:plotArea>
     <c:legend>
       <c:legendPos val="b"/>
+      <c:layout/>
       <c:overlay val="0"/>
       <c:spPr>
         <a:noFill/>
@@ -598,7 +594,7 @@
         <a:lstStyle/>
         <a:p>
           <a:pPr>
-            <a:defRPr sz="1197" b="0" i="0" u="none" strike="noStrike" kern="1200" baseline="0">
+            <a:defRPr lang="zh-CN" sz="1195" b="0" i="0" u="none" strike="noStrike" kern="1200" baseline="0">
               <a:solidFill>
                 <a:schemeClr val="tx2"/>
               </a:solidFill>
@@ -607,7 +603,6 @@
               <a:cs typeface="+mn-cs"/>
             </a:defRPr>
           </a:pPr>
-          <a:endParaRPr lang="zh-CN"/>
         </a:p>
       </c:txPr>
     </c:legend>
@@ -627,12 +622,11 @@
     <a:lstStyle/>
     <a:p>
       <a:pPr>
-        <a:defRPr/>
+        <a:defRPr lang="zh-CN"/>
       </a:pPr>
-      <a:endParaRPr lang="zh-CN"/>
     </a:p>
   </c:txPr>
-  <c:externalData r:id="rId3">
+  <c:externalData r:id="rId1">
     <c:autoUpdate val="0"/>
   </c:externalData>
 </c:chartSpace>
@@ -687,7 +681,7 @@
     <cs:fontRef idx="minor">
       <a:schemeClr val="tx2"/>
     </cs:fontRef>
-    <cs:defRPr sz="1197" b="1" kern="1200"/>
+    <cs:defRPr sz="1195" b="1" kern="1200"/>
   </cs:axisTitle>
   <cs:categoryAxis>
     <cs:lnRef idx="0"/>
@@ -707,7 +701,7 @@
         <a:round/>
       </a:ln>
     </cs:spPr>
-    <cs:defRPr sz="1197" kern="1200"/>
+    <cs:defRPr sz="1195" kern="1200"/>
   </cs:categoryAxis>
   <cs:chartArea mods="allowNoFillOverride allowNoLineOverride">
     <cs:lnRef idx="0"/>
@@ -730,7 +724,7 @@
         <a:round/>
       </a:ln>
     </cs:spPr>
-    <cs:defRPr sz="1197" kern="1200"/>
+    <cs:defRPr sz="1195" kern="1200"/>
   </cs:chartArea>
   <cs:dataLabel>
     <cs:lnRef idx="0"/>
@@ -739,7 +733,7 @@
     <cs:fontRef idx="minor">
       <a:schemeClr val="tx2"/>
     </cs:fontRef>
-    <cs:defRPr sz="1197" kern="1200"/>
+    <cs:defRPr sz="1195" kern="1200"/>
   </cs:dataLabel>
   <cs:dataLabelCallout>
     <cs:lnRef idx="0"/>
@@ -763,7 +757,7 @@
         </a:solidFill>
       </a:ln>
     </cs:spPr>
-    <cs:defRPr sz="1197" kern="1200"/>
+    <cs:defRPr sz="1195" kern="1200"/>
     <cs:bodyPr rot="0" spcFirstLastPara="1" vertOverflow="clip" horzOverflow="clip" vert="horz" wrap="square" lIns="36576" tIns="18288" rIns="36576" bIns="18288" anchor="ctr" anchorCtr="1">
       <a:spAutoFit/>
     </cs:bodyPr>
@@ -860,7 +854,7 @@
         </a:solidFill>
       </a:ln>
     </cs:spPr>
-    <cs:defRPr sz="1197" kern="1200"/>
+    <cs:defRPr sz="1195" kern="1200"/>
   </cs:dataTable>
   <cs:downBar>
     <cs:lnRef idx="0"/>
@@ -1013,7 +1007,7 @@
     <cs:fontRef idx="minor">
       <a:schemeClr val="tx2"/>
     </cs:fontRef>
-    <cs:defRPr sz="1197" kern="1200"/>
+    <cs:defRPr sz="1195" kern="1200"/>
   </cs:legend>
   <cs:plotArea>
     <cs:lnRef idx="0"/>
@@ -1049,7 +1043,7 @@
         <a:round/>
       </a:ln>
     </cs:spPr>
-    <cs:defRPr sz="1197" kern="1200"/>
+    <cs:defRPr sz="1195" kern="1200"/>
   </cs:seriesAxis>
   <cs:seriesLine>
     <cs:lnRef idx="0"/>
@@ -1077,7 +1071,7 @@
     <cs:fontRef idx="minor">
       <a:schemeClr val="tx2"/>
     </cs:fontRef>
-    <cs:defRPr sz="2128" b="1" kern="1200"/>
+    <cs:defRPr sz="2130" b="1" kern="1200"/>
   </cs:title>
   <cs:trendline>
     <cs:lnRef idx="0">
@@ -1104,7 +1098,7 @@
     <cs:fontRef idx="minor">
       <a:schemeClr val="tx2"/>
     </cs:fontRef>
-    <cs:defRPr sz="1197" kern="1200"/>
+    <cs:defRPr sz="1195" kern="1200"/>
   </cs:trendlineLabel>
   <cs:upBar>
     <cs:lnRef idx="0"/>
@@ -1134,7 +1128,7 @@
     <cs:fontRef idx="minor">
       <a:schemeClr val="tx2"/>
     </cs:fontRef>
-    <cs:defRPr sz="1197" kern="1200"/>
+    <cs:defRPr sz="1195" kern="1200"/>
   </cs:valueAxis>
   <cs:wall>
     <cs:lnRef idx="0"/>
@@ -1229,7 +1223,6 @@
           <a:p>
             <a:fld id="{1E5BCEC9-DDE4-4B30-87D6-0017517D5E27}" type="datetimeFigureOut">
               <a:rPr lang="zh-CN" altLang="en-US" smtClean="0"/>
-              <a:t>2022/6/9</a:t>
             </a:fld>
             <a:endParaRPr lang="zh-CN" altLang="en-US"/>
           </a:p>
@@ -1296,6 +1289,7 @@
               <a:rPr lang="zh-CN" altLang="en-US"/>
               <a:t>编辑母版文本样式</a:t>
             </a:r>
+            <a:endParaRPr lang="zh-CN" altLang="en-US"/>
           </a:p>
           <a:p>
             <a:pPr lvl="1"/>
@@ -1303,6 +1297,7 @@
               <a:rPr lang="zh-CN" altLang="en-US"/>
               <a:t>第二级</a:t>
             </a:r>
+            <a:endParaRPr lang="zh-CN" altLang="en-US"/>
           </a:p>
           <a:p>
             <a:pPr lvl="2"/>
@@ -1310,6 +1305,7 @@
               <a:rPr lang="zh-CN" altLang="en-US"/>
               <a:t>第三级</a:t>
             </a:r>
+            <a:endParaRPr lang="zh-CN" altLang="en-US"/>
           </a:p>
           <a:p>
             <a:pPr lvl="3"/>
@@ -1317,6 +1313,7 @@
               <a:rPr lang="zh-CN" altLang="en-US"/>
               <a:t>第四级</a:t>
             </a:r>
+            <a:endParaRPr lang="zh-CN" altLang="en-US"/>
           </a:p>
           <a:p>
             <a:pPr lvl="4"/>
@@ -1324,6 +1321,7 @@
               <a:rPr lang="zh-CN" altLang="en-US"/>
               <a:t>第五级</a:t>
             </a:r>
+            <a:endParaRPr lang="zh-CN" altLang="en-US"/>
           </a:p>
         </p:txBody>
       </p:sp>
@@ -1387,18 +1385,12 @@
           <a:p>
             <a:fld id="{5FD4487E-253C-4F2A-AD3B-D7DF4058A670}" type="slidenum">
               <a:rPr lang="zh-CN" altLang="en-US" smtClean="0"/>
-              <a:t>‹#›</a:t>
             </a:fld>
             <a:endParaRPr lang="zh-CN" altLang="en-US"/>
           </a:p>
         </p:txBody>
       </p:sp>
     </p:spTree>
-    <p:extLst>
-      <p:ext uri="{BB962C8B-B14F-4D97-AF65-F5344CB8AC3E}">
-        <p14:creationId xmlns:p14="http://schemas.microsoft.com/office/powerpoint/2010/main" val="4067275854"/>
-      </p:ext>
-    </p:extLst>
   </p:cSld>
   <p:clrMap bg1="lt1" tx1="dk1" bg2="lt2" tx2="dk2" accent1="accent1" accent2="accent2" accent3="accent3" accent4="accent4" accent5="accent5" accent6="accent6" hlink="hlink" folHlink="folHlink"/>
   <p:notesStyle>
@@ -1534,8 +1526,6 @@
               <a:srgbClr val="000000"/>
             </a:solidFill>
             <a:miter lim="800000"/>
-            <a:headEnd/>
-            <a:tailEnd/>
           </a:ln>
           <a:extLst>
             <a:ext uri="{909E8E84-426E-40DD-AFC4-6F175D3DCCD1}">
@@ -1544,9 +1534,6 @@
                   <a:srgbClr val="FFFFFF"/>
                 </a:solidFill>
               </a14:hiddenFill>
-            </a:ext>
-            <a:ext uri="{FAA26D3D-D897-4be2-8F04-BA451C77F1D7}">
-              <ma14:placeholderFlag xmlns:ma14="http://schemas.microsoft.com/office/mac/drawingml/2011/main" xmlns="" val="1"/>
             </a:ext>
           </a:extLst>
         </p:spPr>
@@ -1591,6 +1578,7 @@
               <a:rPr lang="zh-CN" altLang="en-US" dirty="0"/>
               <a:t>照片为学生拍摄的礼堂</a:t>
             </a:r>
+            <a:endParaRPr lang="zh-CN" altLang="en-US" dirty="0"/>
           </a:p>
         </p:txBody>
       </p:sp>
@@ -1634,8 +1622,8 @@
                 <a:solidFill>
                   <a:schemeClr val="tx1"/>
                 </a:solidFill>
-                <a:latin typeface="Arial" charset="0"/>
-                <a:ea typeface="华文中宋" charset="0"/>
+                <a:latin typeface="Arial" panose="020B0604020202020204" pitchFamily="34" charset="0"/>
+                <a:ea typeface="华文中宋" panose="02010600040101010101" charset="-122"/>
               </a:defRPr>
             </a:lvl1pPr>
             <a:lvl2pPr marL="742950" indent="-285750">
@@ -1643,8 +1631,8 @@
                 <a:solidFill>
                   <a:schemeClr val="tx1"/>
                 </a:solidFill>
-                <a:latin typeface="Arial" charset="0"/>
-                <a:ea typeface="华文中宋" charset="0"/>
+                <a:latin typeface="Arial" panose="020B0604020202020204" pitchFamily="34" charset="0"/>
+                <a:ea typeface="华文中宋" panose="02010600040101010101" charset="-122"/>
               </a:defRPr>
             </a:lvl2pPr>
             <a:lvl3pPr marL="1143000" indent="-228600">
@@ -1652,8 +1640,8 @@
                 <a:solidFill>
                   <a:schemeClr val="tx1"/>
                 </a:solidFill>
-                <a:latin typeface="Arial" charset="0"/>
-                <a:ea typeface="华文中宋" charset="0"/>
+                <a:latin typeface="Arial" panose="020B0604020202020204" pitchFamily="34" charset="0"/>
+                <a:ea typeface="华文中宋" panose="02010600040101010101" charset="-122"/>
               </a:defRPr>
             </a:lvl3pPr>
             <a:lvl4pPr marL="1600200" indent="-228600">
@@ -1661,8 +1649,8 @@
                 <a:solidFill>
                   <a:schemeClr val="tx1"/>
                 </a:solidFill>
-                <a:latin typeface="Arial" charset="0"/>
-                <a:ea typeface="华文中宋" charset="0"/>
+                <a:latin typeface="Arial" panose="020B0604020202020204" pitchFamily="34" charset="0"/>
+                <a:ea typeface="华文中宋" panose="02010600040101010101" charset="-122"/>
               </a:defRPr>
             </a:lvl4pPr>
             <a:lvl5pPr marL="2057400" indent="-228600">
@@ -1670,8 +1658,8 @@
                 <a:solidFill>
                   <a:schemeClr val="tx1"/>
                 </a:solidFill>
-                <a:latin typeface="Arial" charset="0"/>
-                <a:ea typeface="华文中宋" charset="0"/>
+                <a:latin typeface="Arial" panose="020B0604020202020204" pitchFamily="34" charset="0"/>
+                <a:ea typeface="华文中宋" panose="02010600040101010101" charset="-122"/>
               </a:defRPr>
             </a:lvl5pPr>
             <a:lvl6pPr marL="2514600" indent="-228600" eaLnBrk="0" fontAlgn="base" hangingPunct="0">
@@ -1685,8 +1673,8 @@
                 <a:solidFill>
                   <a:schemeClr val="tx1"/>
                 </a:solidFill>
-                <a:latin typeface="Arial" charset="0"/>
-                <a:ea typeface="华文中宋" charset="0"/>
+                <a:latin typeface="Arial" panose="020B0604020202020204" pitchFamily="34" charset="0"/>
+                <a:ea typeface="华文中宋" panose="02010600040101010101" charset="-122"/>
               </a:defRPr>
             </a:lvl6pPr>
             <a:lvl7pPr marL="2971800" indent="-228600" eaLnBrk="0" fontAlgn="base" hangingPunct="0">
@@ -1700,8 +1688,8 @@
                 <a:solidFill>
                   <a:schemeClr val="tx1"/>
                 </a:solidFill>
-                <a:latin typeface="Arial" charset="0"/>
-                <a:ea typeface="华文中宋" charset="0"/>
+                <a:latin typeface="Arial" panose="020B0604020202020204" pitchFamily="34" charset="0"/>
+                <a:ea typeface="华文中宋" panose="02010600040101010101" charset="-122"/>
               </a:defRPr>
             </a:lvl7pPr>
             <a:lvl8pPr marL="3429000" indent="-228600" eaLnBrk="0" fontAlgn="base" hangingPunct="0">
@@ -1715,8 +1703,8 @@
                 <a:solidFill>
                   <a:schemeClr val="tx1"/>
                 </a:solidFill>
-                <a:latin typeface="Arial" charset="0"/>
-                <a:ea typeface="华文中宋" charset="0"/>
+                <a:latin typeface="Arial" panose="020B0604020202020204" pitchFamily="34" charset="0"/>
+                <a:ea typeface="华文中宋" panose="02010600040101010101" charset="-122"/>
               </a:defRPr>
             </a:lvl8pPr>
             <a:lvl9pPr marL="3886200" indent="-228600" eaLnBrk="0" fontAlgn="base" hangingPunct="0">
@@ -1730,8 +1718,8 @@
                 <a:solidFill>
                   <a:schemeClr val="tx1"/>
                 </a:solidFill>
-                <a:latin typeface="Arial" charset="0"/>
-                <a:ea typeface="华文中宋" charset="0"/>
+                <a:latin typeface="Arial" panose="020B0604020202020204" pitchFamily="34" charset="0"/>
+                <a:ea typeface="华文中宋" panose="02010600040101010101" charset="-122"/>
               </a:defRPr>
             </a:lvl9pPr>
           </a:lstStyle>
@@ -1750,7 +1738,6 @@
               <a:buSzTx/>
               <a:buFontTx/>
               <a:buNone/>
-              <a:tabLst/>
               <a:defRPr/>
             </a:pPr>
             <a:fld id="{9F000F6D-74D8-0C46-B428-4DE0EB034880}" type="slidenum">
@@ -1764,28 +1751,10 @@
                 <a:effectLst/>
                 <a:uLnTx/>
                 <a:uFillTx/>
-                <a:latin typeface="Arial" charset="0"/>
-                <a:ea typeface="宋体" charset="0"/>
+                <a:latin typeface="Arial" panose="020B0604020202020204" pitchFamily="34" charset="0"/>
+                <a:ea typeface="宋体" panose="02010600030101010101" pitchFamily="2" charset="-122"/>
                 <a:cs typeface="+mn-cs"/>
               </a:rPr>
-              <a:pPr marL="0" marR="0" lvl="0" indent="0" algn="r" defTabSz="914400" rtl="0" eaLnBrk="1" fontAlgn="base" latinLnBrk="0" hangingPunct="1">
-                <a:lnSpc>
-                  <a:spcPct val="100000"/>
-                </a:lnSpc>
-                <a:spcBef>
-                  <a:spcPct val="0"/>
-                </a:spcBef>
-                <a:spcAft>
-                  <a:spcPct val="0"/>
-                </a:spcAft>
-                <a:buClrTx/>
-                <a:buSzTx/>
-                <a:buFontTx/>
-                <a:buNone/>
-                <a:tabLst/>
-                <a:defRPr/>
-              </a:pPr>
-              <a:t>1</a:t>
             </a:fld>
             <a:endParaRPr kumimoji="0" lang="en-US" altLang="zh-CN" sz="1200" b="0" i="0" u="none" strike="noStrike" kern="1200" cap="none" spc="0" normalizeH="0" baseline="0" noProof="0">
               <a:ln>
@@ -1797,19 +1766,14 @@
               <a:effectLst/>
               <a:uLnTx/>
               <a:uFillTx/>
-              <a:latin typeface="Arial" charset="0"/>
-              <a:ea typeface="宋体" charset="0"/>
+              <a:latin typeface="Arial" panose="020B0604020202020204" pitchFamily="34" charset="0"/>
+              <a:ea typeface="宋体" panose="02010600030101010101" pitchFamily="2" charset="-122"/>
               <a:cs typeface="+mn-cs"/>
             </a:endParaRPr>
           </a:p>
         </p:txBody>
       </p:sp>
     </p:spTree>
-    <p:extLst>
-      <p:ext uri="{BB962C8B-B14F-4D97-AF65-F5344CB8AC3E}">
-        <p14:creationId xmlns:p14="http://schemas.microsoft.com/office/powerpoint/2010/main" val="1679339438"/>
-      </p:ext>
-    </p:extLst>
   </p:cSld>
   <p:clrMapOvr>
     <a:masterClrMapping/>
@@ -1865,6 +1829,7 @@
               <a:rPr lang="zh-CN" altLang="en-US" dirty="0"/>
               <a:t>图片可以替换</a:t>
             </a:r>
+            <a:endParaRPr lang="zh-CN" altLang="en-US" dirty="0"/>
           </a:p>
         </p:txBody>
       </p:sp>
@@ -1885,18 +1850,12 @@
           <a:p>
             <a:fld id="{5FD4487E-253C-4F2A-AD3B-D7DF4058A670}" type="slidenum">
               <a:rPr lang="zh-CN" altLang="en-US" smtClean="0"/>
-              <a:t>2</a:t>
             </a:fld>
             <a:endParaRPr lang="zh-CN" altLang="en-US"/>
           </a:p>
         </p:txBody>
       </p:sp>
     </p:spTree>
-    <p:extLst>
-      <p:ext uri="{BB962C8B-B14F-4D97-AF65-F5344CB8AC3E}">
-        <p14:creationId xmlns:p14="http://schemas.microsoft.com/office/powerpoint/2010/main" val="535298693"/>
-      </p:ext>
-    </p:extLst>
   </p:cSld>
   <p:clrMapOvr>
     <a:masterClrMapping/>
@@ -1969,18 +1928,12 @@
           <a:p>
             <a:fld id="{5FD4487E-253C-4F2A-AD3B-D7DF4058A670}" type="slidenum">
               <a:rPr lang="zh-CN" altLang="en-US" smtClean="0"/>
-              <a:t>3</a:t>
             </a:fld>
             <a:endParaRPr lang="zh-CN" altLang="en-US"/>
           </a:p>
         </p:txBody>
       </p:sp>
     </p:spTree>
-    <p:extLst>
-      <p:ext uri="{BB962C8B-B14F-4D97-AF65-F5344CB8AC3E}">
-        <p14:creationId xmlns:p14="http://schemas.microsoft.com/office/powerpoint/2010/main" val="2069157687"/>
-      </p:ext>
-    </p:extLst>
   </p:cSld>
   <p:clrMapOvr>
     <a:masterClrMapping/>
@@ -2053,18 +2006,12 @@
           <a:p>
             <a:fld id="{5FD4487E-253C-4F2A-AD3B-D7DF4058A670}" type="slidenum">
               <a:rPr lang="zh-CN" altLang="en-US" smtClean="0"/>
-              <a:t>4</a:t>
             </a:fld>
             <a:endParaRPr lang="zh-CN" altLang="en-US"/>
           </a:p>
         </p:txBody>
       </p:sp>
     </p:spTree>
-    <p:extLst>
-      <p:ext uri="{BB962C8B-B14F-4D97-AF65-F5344CB8AC3E}">
-        <p14:creationId xmlns:p14="http://schemas.microsoft.com/office/powerpoint/2010/main" val="3916380748"/>
-      </p:ext>
-    </p:extLst>
   </p:cSld>
   <p:clrMapOvr>
     <a:masterClrMapping/>
@@ -2137,18 +2084,12 @@
           <a:p>
             <a:fld id="{5FD4487E-253C-4F2A-AD3B-D7DF4058A670}" type="slidenum">
               <a:rPr lang="zh-CN" altLang="en-US" smtClean="0"/>
-              <a:t>6</a:t>
             </a:fld>
             <a:endParaRPr lang="zh-CN" altLang="en-US"/>
           </a:p>
         </p:txBody>
       </p:sp>
     </p:spTree>
-    <p:extLst>
-      <p:ext uri="{BB962C8B-B14F-4D97-AF65-F5344CB8AC3E}">
-        <p14:creationId xmlns:p14="http://schemas.microsoft.com/office/powerpoint/2010/main" val="3624826156"/>
-      </p:ext>
-    </p:extLst>
   </p:cSld>
   <p:clrMapOvr>
     <a:masterClrMapping/>
@@ -2212,7 +2153,7 @@
             <a:spLocks noGrp="1"/>
           </p:cNvSpPr>
           <p:nvPr>
-            <p:ph type="subTitle" idx="1"/>
+            <p:ph type="subTitle" idx="1" hasCustomPrompt="1"/>
           </p:nvPr>
         </p:nvSpPr>
         <p:spPr>
@@ -2299,7 +2240,6 @@
               <a:buSzTx/>
               <a:buFontTx/>
               <a:buNone/>
-              <a:tabLst/>
               <a:defRPr/>
             </a:pPr>
             <a:fld id="{A32C326A-3541-E547-8C03-5779D23648EF}" type="datetimeFigureOut">
@@ -2315,28 +2255,10 @@
                 <a:effectLst/>
                 <a:uLnTx/>
                 <a:uFillTx/>
-                <a:latin typeface="Arial" charset="0"/>
-                <a:ea typeface="华文中宋" charset="0"/>
+                <a:latin typeface="Arial" panose="020B0604020202020204" pitchFamily="34" charset="0"/>
+                <a:ea typeface="华文中宋" panose="02010600040101010101" charset="-122"/>
                 <a:cs typeface="+mn-cs"/>
               </a:rPr>
-              <a:pPr marL="0" marR="0" lvl="0" indent="0" algn="l" defTabSz="914400" rtl="0" eaLnBrk="0" fontAlgn="base" latinLnBrk="0" hangingPunct="0">
-                <a:lnSpc>
-                  <a:spcPct val="100000"/>
-                </a:lnSpc>
-                <a:spcBef>
-                  <a:spcPct val="0"/>
-                </a:spcBef>
-                <a:spcAft>
-                  <a:spcPct val="0"/>
-                </a:spcAft>
-                <a:buClrTx/>
-                <a:buSzTx/>
-                <a:buFontTx/>
-                <a:buNone/>
-                <a:tabLst/>
-                <a:defRPr/>
-              </a:pPr>
-              <a:t>2022/6/9</a:t>
             </a:fld>
             <a:endParaRPr kumimoji="0" lang="zh-CN" altLang="en-US" sz="1200" b="1" i="0" u="none" strike="noStrike" kern="1200" cap="none" spc="0" normalizeH="0" baseline="0" noProof="0">
               <a:ln>
@@ -2350,8 +2272,8 @@
               <a:effectLst/>
               <a:uLnTx/>
               <a:uFillTx/>
-              <a:latin typeface="Arial" charset="0"/>
-              <a:ea typeface="华文中宋" charset="0"/>
+              <a:latin typeface="Arial" panose="020B0604020202020204" pitchFamily="34" charset="0"/>
+              <a:ea typeface="华文中宋" panose="02010600040101010101" charset="-122"/>
               <a:cs typeface="+mn-cs"/>
             </a:endParaRPr>
           </a:p>
@@ -2386,7 +2308,6 @@
               <a:buSzTx/>
               <a:buFontTx/>
               <a:buNone/>
-              <a:tabLst/>
               <a:defRPr/>
             </a:pPr>
             <a:endParaRPr kumimoji="0" lang="zh-CN" altLang="en-US" sz="1200" b="1" i="0" u="none" strike="noStrike" kern="1200" cap="none" spc="0" normalizeH="0" baseline="0" noProof="0">
@@ -2401,8 +2322,8 @@
               <a:effectLst/>
               <a:uLnTx/>
               <a:uFillTx/>
-              <a:latin typeface="Arial" charset="0"/>
-              <a:ea typeface="华文中宋" charset="0"/>
+              <a:latin typeface="Arial" panose="020B0604020202020204" pitchFamily="34" charset="0"/>
+              <a:ea typeface="华文中宋" panose="02010600040101010101" charset="-122"/>
               <a:cs typeface="+mn-cs"/>
             </a:endParaRPr>
           </a:p>
@@ -2437,7 +2358,6 @@
               <a:buSzTx/>
               <a:buFontTx/>
               <a:buNone/>
-              <a:tabLst/>
               <a:defRPr/>
             </a:pPr>
             <a:fld id="{E3597BDB-C194-6F4E-8639-1B954A600FDB}" type="slidenum">
@@ -2453,28 +2373,10 @@
                 <a:effectLst/>
                 <a:uLnTx/>
                 <a:uFillTx/>
-                <a:latin typeface="Arial" charset="0"/>
-                <a:ea typeface="华文中宋" charset="0"/>
+                <a:latin typeface="Arial" panose="020B0604020202020204" pitchFamily="34" charset="0"/>
+                <a:ea typeface="华文中宋" panose="02010600040101010101" charset="-122"/>
                 <a:cs typeface="+mn-cs"/>
               </a:rPr>
-              <a:pPr marL="0" marR="0" lvl="0" indent="0" algn="r" defTabSz="914400" rtl="0" eaLnBrk="0" fontAlgn="base" latinLnBrk="0" hangingPunct="0">
-                <a:lnSpc>
-                  <a:spcPct val="100000"/>
-                </a:lnSpc>
-                <a:spcBef>
-                  <a:spcPct val="0"/>
-                </a:spcBef>
-                <a:spcAft>
-                  <a:spcPct val="0"/>
-                </a:spcAft>
-                <a:buClrTx/>
-                <a:buSzTx/>
-                <a:buFontTx/>
-                <a:buNone/>
-                <a:tabLst/>
-                <a:defRPr/>
-              </a:pPr>
-              <a:t>‹#›</a:t>
             </a:fld>
             <a:endParaRPr kumimoji="0" lang="en-US" altLang="zh-CN" sz="1200" b="1" i="0" u="none" strike="noStrike" kern="1200" cap="none" spc="0" normalizeH="0" baseline="0" noProof="0">
               <a:ln>
@@ -2488,19 +2390,14 @@
               <a:effectLst/>
               <a:uLnTx/>
               <a:uFillTx/>
-              <a:latin typeface="Arial" charset="0"/>
-              <a:ea typeface="华文中宋" charset="0"/>
+              <a:latin typeface="Arial" panose="020B0604020202020204" pitchFamily="34" charset="0"/>
+              <a:ea typeface="华文中宋" panose="02010600040101010101" charset="-122"/>
               <a:cs typeface="+mn-cs"/>
             </a:endParaRPr>
           </a:p>
         </p:txBody>
       </p:sp>
     </p:spTree>
-    <p:extLst>
-      <p:ext uri="{BB962C8B-B14F-4D97-AF65-F5344CB8AC3E}">
-        <p14:creationId xmlns:p14="http://schemas.microsoft.com/office/powerpoint/2010/main" val="806794068"/>
-      </p:ext>
-    </p:extLst>
   </p:cSld>
   <p:clrMapOvr>
     <a:masterClrMapping/>
@@ -2532,7 +2429,7 @@
             <a:spLocks noGrp="1"/>
           </p:cNvSpPr>
           <p:nvPr>
-            <p:ph idx="1"/>
+            <p:ph idx="1" hasCustomPrompt="1"/>
           </p:nvPr>
         </p:nvSpPr>
         <p:spPr>
@@ -2550,6 +2447,7 @@
               <a:rPr lang="zh-CN" altLang="en-US" dirty="0"/>
               <a:t>编辑母版文本样式</a:t>
             </a:r>
+            <a:endParaRPr lang="zh-CN" altLang="en-US" dirty="0"/>
           </a:p>
           <a:p>
             <a:pPr lvl="1"/>
@@ -2557,6 +2455,7 @@
               <a:rPr lang="zh-CN" altLang="en-US" dirty="0"/>
               <a:t>第二级</a:t>
             </a:r>
+            <a:endParaRPr lang="zh-CN" altLang="en-US" dirty="0"/>
           </a:p>
           <a:p>
             <a:pPr lvl="2"/>
@@ -2564,6 +2463,7 @@
               <a:rPr lang="zh-CN" altLang="en-US" dirty="0"/>
               <a:t>第三级</a:t>
             </a:r>
+            <a:endParaRPr lang="zh-CN" altLang="en-US" dirty="0"/>
           </a:p>
           <a:p>
             <a:pPr lvl="3"/>
@@ -2571,6 +2471,7 @@
               <a:rPr lang="zh-CN" altLang="en-US" dirty="0"/>
               <a:t>第四级</a:t>
             </a:r>
+            <a:endParaRPr lang="zh-CN" altLang="en-US" dirty="0"/>
           </a:p>
           <a:p>
             <a:pPr lvl="4"/>
@@ -2615,7 +2516,6 @@
               <a:buSzTx/>
               <a:buFontTx/>
               <a:buNone/>
-              <a:tabLst/>
               <a:defRPr/>
             </a:pPr>
             <a:fld id="{B7777B4F-0286-DE44-939A-59B26D3141B7}" type="datetimeFigureOut">
@@ -2631,28 +2531,10 @@
                 <a:effectLst/>
                 <a:uLnTx/>
                 <a:uFillTx/>
-                <a:latin typeface="Arial" charset="0"/>
-                <a:ea typeface="华文中宋" charset="0"/>
+                <a:latin typeface="Arial" panose="020B0604020202020204" pitchFamily="34" charset="0"/>
+                <a:ea typeface="华文中宋" panose="02010600040101010101" charset="-122"/>
                 <a:cs typeface="+mn-cs"/>
               </a:rPr>
-              <a:pPr marL="0" marR="0" lvl="0" indent="0" algn="l" defTabSz="914400" rtl="0" eaLnBrk="0" fontAlgn="base" latinLnBrk="0" hangingPunct="0">
-                <a:lnSpc>
-                  <a:spcPct val="100000"/>
-                </a:lnSpc>
-                <a:spcBef>
-                  <a:spcPct val="0"/>
-                </a:spcBef>
-                <a:spcAft>
-                  <a:spcPct val="0"/>
-                </a:spcAft>
-                <a:buClrTx/>
-                <a:buSzTx/>
-                <a:buFontTx/>
-                <a:buNone/>
-                <a:tabLst/>
-                <a:defRPr/>
-              </a:pPr>
-              <a:t>2022/6/9</a:t>
             </a:fld>
             <a:endParaRPr kumimoji="0" lang="zh-CN" altLang="en-US" sz="1200" b="1" i="0" u="none" strike="noStrike" kern="1200" cap="none" spc="0" normalizeH="0" baseline="0" noProof="0">
               <a:ln>
@@ -2666,8 +2548,8 @@
               <a:effectLst/>
               <a:uLnTx/>
               <a:uFillTx/>
-              <a:latin typeface="Arial" charset="0"/>
-              <a:ea typeface="华文中宋" charset="0"/>
+              <a:latin typeface="Arial" panose="020B0604020202020204" pitchFamily="34" charset="0"/>
+              <a:ea typeface="华文中宋" panose="02010600040101010101" charset="-122"/>
               <a:cs typeface="+mn-cs"/>
             </a:endParaRPr>
           </a:p>
@@ -2702,7 +2584,6 @@
               <a:buSzTx/>
               <a:buFontTx/>
               <a:buNone/>
-              <a:tabLst/>
               <a:defRPr/>
             </a:pPr>
             <a:endParaRPr kumimoji="0" lang="zh-CN" altLang="en-US" sz="1200" b="1" i="0" u="none" strike="noStrike" kern="1200" cap="none" spc="0" normalizeH="0" baseline="0" noProof="0">
@@ -2717,8 +2598,8 @@
               <a:effectLst/>
               <a:uLnTx/>
               <a:uFillTx/>
-              <a:latin typeface="Arial" charset="0"/>
-              <a:ea typeface="华文中宋" charset="0"/>
+              <a:latin typeface="Arial" panose="020B0604020202020204" pitchFamily="34" charset="0"/>
+              <a:ea typeface="华文中宋" panose="02010600040101010101" charset="-122"/>
               <a:cs typeface="+mn-cs"/>
             </a:endParaRPr>
           </a:p>
@@ -2753,7 +2634,6 @@
               <a:buSzTx/>
               <a:buFontTx/>
               <a:buNone/>
-              <a:tabLst/>
               <a:defRPr/>
             </a:pPr>
             <a:fld id="{EADB0674-9F2F-9048-8F8C-240B2AE1FAC2}" type="slidenum">
@@ -2769,28 +2649,10 @@
                 <a:effectLst/>
                 <a:uLnTx/>
                 <a:uFillTx/>
-                <a:latin typeface="Arial" charset="0"/>
-                <a:ea typeface="华文中宋" charset="0"/>
+                <a:latin typeface="Arial" panose="020B0604020202020204" pitchFamily="34" charset="0"/>
+                <a:ea typeface="华文中宋" panose="02010600040101010101" charset="-122"/>
                 <a:cs typeface="+mn-cs"/>
               </a:rPr>
-              <a:pPr marL="0" marR="0" lvl="0" indent="0" algn="r" defTabSz="914400" rtl="0" eaLnBrk="0" fontAlgn="base" latinLnBrk="0" hangingPunct="0">
-                <a:lnSpc>
-                  <a:spcPct val="100000"/>
-                </a:lnSpc>
-                <a:spcBef>
-                  <a:spcPct val="0"/>
-                </a:spcBef>
-                <a:spcAft>
-                  <a:spcPct val="0"/>
-                </a:spcAft>
-                <a:buClrTx/>
-                <a:buSzTx/>
-                <a:buFontTx/>
-                <a:buNone/>
-                <a:tabLst/>
-                <a:defRPr/>
-              </a:pPr>
-              <a:t>‹#›</a:t>
             </a:fld>
             <a:endParaRPr kumimoji="0" lang="en-US" altLang="zh-CN" sz="1200" b="1" i="0" u="none" strike="noStrike" kern="1200" cap="none" spc="0" normalizeH="0" baseline="0" noProof="0">
               <a:ln>
@@ -2804,8 +2666,8 @@
               <a:effectLst/>
               <a:uLnTx/>
               <a:uFillTx/>
-              <a:latin typeface="Arial" charset="0"/>
-              <a:ea typeface="华文中宋" charset="0"/>
+              <a:latin typeface="Arial" panose="020B0604020202020204" pitchFamily="34" charset="0"/>
+              <a:ea typeface="华文中宋" panose="02010600040101010101" charset="-122"/>
               <a:cs typeface="+mn-cs"/>
             </a:endParaRPr>
           </a:p>
@@ -2938,13 +2800,7 @@
           <p:nvPr userDrawn="1"/>
         </p:nvPicPr>
         <p:blipFill>
-          <a:blip r:embed="rId2" cstate="screen">
-            <a:extLst>
-              <a:ext uri="{28A0092B-C50C-407E-A947-70E740481C1C}">
-                <a14:useLocalDpi xmlns:a14="http://schemas.microsoft.com/office/drawing/2010/main"/>
-              </a:ext>
-            </a:extLst>
-          </a:blip>
+          <a:blip r:embed="rId2" cstate="screen"/>
           <a:srcRect/>
           <a:stretch>
             <a:fillRect/>
@@ -2984,11 +2840,6 @@
         </p:spPr>
       </p:pic>
     </p:spTree>
-    <p:extLst>
-      <p:ext uri="{BB962C8B-B14F-4D97-AF65-F5344CB8AC3E}">
-        <p14:creationId xmlns:p14="http://schemas.microsoft.com/office/powerpoint/2010/main" val="2541548439"/>
-      </p:ext>
-    </p:extLst>
   </p:cSld>
   <p:clrMapOvr>
     <a:masterClrMapping/>
@@ -3128,7 +2979,6 @@
               <a:buSzTx/>
               <a:buFontTx/>
               <a:buNone/>
-              <a:tabLst/>
               <a:defRPr/>
             </a:pPr>
             <a:fld id="{87F89CA9-0F6A-E745-B1B5-0B3A7BE5D970}" type="datetimeFigureOut">
@@ -3144,28 +2994,10 @@
                 <a:effectLst/>
                 <a:uLnTx/>
                 <a:uFillTx/>
-                <a:latin typeface="Arial" charset="0"/>
-                <a:ea typeface="华文中宋" charset="0"/>
+                <a:latin typeface="Arial" panose="020B0604020202020204" pitchFamily="34" charset="0"/>
+                <a:ea typeface="华文中宋" panose="02010600040101010101" charset="-122"/>
                 <a:cs typeface="+mn-cs"/>
               </a:rPr>
-              <a:pPr marL="0" marR="0" lvl="0" indent="0" algn="l" defTabSz="914400" rtl="0" eaLnBrk="0" fontAlgn="base" latinLnBrk="0" hangingPunct="0">
-                <a:lnSpc>
-                  <a:spcPct val="100000"/>
-                </a:lnSpc>
-                <a:spcBef>
-                  <a:spcPct val="0"/>
-                </a:spcBef>
-                <a:spcAft>
-                  <a:spcPct val="0"/>
-                </a:spcAft>
-                <a:buClrTx/>
-                <a:buSzTx/>
-                <a:buFontTx/>
-                <a:buNone/>
-                <a:tabLst/>
-                <a:defRPr/>
-              </a:pPr>
-              <a:t>2022/6/9</a:t>
             </a:fld>
             <a:endParaRPr kumimoji="0" lang="zh-CN" altLang="en-US" sz="1200" b="1" i="0" u="none" strike="noStrike" kern="1200" cap="none" spc="0" normalizeH="0" baseline="0" noProof="0">
               <a:ln>
@@ -3179,8 +3011,8 @@
               <a:effectLst/>
               <a:uLnTx/>
               <a:uFillTx/>
-              <a:latin typeface="Arial" charset="0"/>
-              <a:ea typeface="华文中宋" charset="0"/>
+              <a:latin typeface="Arial" panose="020B0604020202020204" pitchFamily="34" charset="0"/>
+              <a:ea typeface="华文中宋" panose="02010600040101010101" charset="-122"/>
               <a:cs typeface="+mn-cs"/>
             </a:endParaRPr>
           </a:p>
@@ -3215,7 +3047,6 @@
               <a:buSzTx/>
               <a:buFontTx/>
               <a:buNone/>
-              <a:tabLst/>
               <a:defRPr/>
             </a:pPr>
             <a:endParaRPr kumimoji="0" lang="zh-CN" altLang="en-US" sz="1200" b="1" i="0" u="none" strike="noStrike" kern="1200" cap="none" spc="0" normalizeH="0" baseline="0" noProof="0">
@@ -3230,8 +3061,8 @@
               <a:effectLst/>
               <a:uLnTx/>
               <a:uFillTx/>
-              <a:latin typeface="Arial" charset="0"/>
-              <a:ea typeface="华文中宋" charset="0"/>
+              <a:latin typeface="Arial" panose="020B0604020202020204" pitchFamily="34" charset="0"/>
+              <a:ea typeface="华文中宋" panose="02010600040101010101" charset="-122"/>
               <a:cs typeface="+mn-cs"/>
             </a:endParaRPr>
           </a:p>
@@ -3266,7 +3097,6 @@
               <a:buSzTx/>
               <a:buFontTx/>
               <a:buNone/>
-              <a:tabLst/>
               <a:defRPr/>
             </a:pPr>
             <a:fld id="{0B721F5A-A6F2-4C4E-BFC8-8F7E8C0B0E84}" type="slidenum">
@@ -3282,28 +3112,10 @@
                 <a:effectLst/>
                 <a:uLnTx/>
                 <a:uFillTx/>
-                <a:latin typeface="Arial" charset="0"/>
-                <a:ea typeface="华文中宋" charset="0"/>
+                <a:latin typeface="Arial" panose="020B0604020202020204" pitchFamily="34" charset="0"/>
+                <a:ea typeface="华文中宋" panose="02010600040101010101" charset="-122"/>
                 <a:cs typeface="+mn-cs"/>
               </a:rPr>
-              <a:pPr marL="0" marR="0" lvl="0" indent="0" algn="r" defTabSz="914400" rtl="0" eaLnBrk="0" fontAlgn="base" latinLnBrk="0" hangingPunct="0">
-                <a:lnSpc>
-                  <a:spcPct val="100000"/>
-                </a:lnSpc>
-                <a:spcBef>
-                  <a:spcPct val="0"/>
-                </a:spcBef>
-                <a:spcAft>
-                  <a:spcPct val="0"/>
-                </a:spcAft>
-                <a:buClrTx/>
-                <a:buSzTx/>
-                <a:buFontTx/>
-                <a:buNone/>
-                <a:tabLst/>
-                <a:defRPr/>
-              </a:pPr>
-              <a:t>‹#›</a:t>
             </a:fld>
             <a:endParaRPr kumimoji="0" lang="en-US" altLang="zh-CN" sz="1200" b="1" i="0" u="none" strike="noStrike" kern="1200" cap="none" spc="0" normalizeH="0" baseline="0" noProof="0">
               <a:ln>
@@ -3317,8 +3129,8 @@
               <a:effectLst/>
               <a:uLnTx/>
               <a:uFillTx/>
-              <a:latin typeface="Arial" charset="0"/>
-              <a:ea typeface="华文中宋" charset="0"/>
+              <a:latin typeface="Arial" panose="020B0604020202020204" pitchFamily="34" charset="0"/>
+              <a:ea typeface="华文中宋" panose="02010600040101010101" charset="-122"/>
               <a:cs typeface="+mn-cs"/>
             </a:endParaRPr>
           </a:p>
@@ -3452,13 +3264,7 @@
           <p:nvPr userDrawn="1"/>
         </p:nvPicPr>
         <p:blipFill>
-          <a:blip r:embed="rId2" cstate="screen">
-            <a:extLst>
-              <a:ext uri="{28A0092B-C50C-407E-A947-70E740481C1C}">
-                <a14:useLocalDpi xmlns:a14="http://schemas.microsoft.com/office/drawing/2010/main"/>
-              </a:ext>
-            </a:extLst>
-          </a:blip>
+          <a:blip r:embed="rId2" cstate="screen"/>
           <a:srcRect/>
           <a:stretch>
             <a:fillRect/>
@@ -3498,11 +3304,6 @@
         </p:spPr>
       </p:pic>
     </p:spTree>
-    <p:extLst>
-      <p:ext uri="{BB962C8B-B14F-4D97-AF65-F5344CB8AC3E}">
-        <p14:creationId xmlns:p14="http://schemas.microsoft.com/office/powerpoint/2010/main" val="3210600244"/>
-      </p:ext>
-    </p:extLst>
   </p:cSld>
   <p:clrMapOvr>
     <a:masterClrMapping/>
@@ -3642,7 +3443,6 @@
               <a:buSzTx/>
               <a:buFontTx/>
               <a:buNone/>
-              <a:tabLst/>
               <a:defRPr/>
             </a:pPr>
             <a:fld id="{30E72066-6174-6145-AA6B-3DE5C9EA0DC8}" type="datetimeFigureOut">
@@ -3658,28 +3458,10 @@
                 <a:effectLst/>
                 <a:uLnTx/>
                 <a:uFillTx/>
-                <a:latin typeface="Arial" charset="0"/>
-                <a:ea typeface="华文中宋" charset="0"/>
+                <a:latin typeface="Arial" panose="020B0604020202020204" pitchFamily="34" charset="0"/>
+                <a:ea typeface="华文中宋" panose="02010600040101010101" charset="-122"/>
                 <a:cs typeface="+mn-cs"/>
               </a:rPr>
-              <a:pPr marL="0" marR="0" lvl="0" indent="0" algn="l" defTabSz="914400" rtl="0" eaLnBrk="0" fontAlgn="base" latinLnBrk="0" hangingPunct="0">
-                <a:lnSpc>
-                  <a:spcPct val="100000"/>
-                </a:lnSpc>
-                <a:spcBef>
-                  <a:spcPct val="0"/>
-                </a:spcBef>
-                <a:spcAft>
-                  <a:spcPct val="0"/>
-                </a:spcAft>
-                <a:buClrTx/>
-                <a:buSzTx/>
-                <a:buFontTx/>
-                <a:buNone/>
-                <a:tabLst/>
-                <a:defRPr/>
-              </a:pPr>
-              <a:t>2022/6/9</a:t>
             </a:fld>
             <a:endParaRPr kumimoji="0" lang="zh-CN" altLang="en-US" sz="1200" b="1" i="0" u="none" strike="noStrike" kern="1200" cap="none" spc="0" normalizeH="0" baseline="0" noProof="0">
               <a:ln>
@@ -3693,8 +3475,8 @@
               <a:effectLst/>
               <a:uLnTx/>
               <a:uFillTx/>
-              <a:latin typeface="Arial" charset="0"/>
-              <a:ea typeface="华文中宋" charset="0"/>
+              <a:latin typeface="Arial" panose="020B0604020202020204" pitchFamily="34" charset="0"/>
+              <a:ea typeface="华文中宋" panose="02010600040101010101" charset="-122"/>
               <a:cs typeface="+mn-cs"/>
             </a:endParaRPr>
           </a:p>
@@ -3729,7 +3511,6 @@
               <a:buSzTx/>
               <a:buFontTx/>
               <a:buNone/>
-              <a:tabLst/>
               <a:defRPr/>
             </a:pPr>
             <a:endParaRPr kumimoji="0" lang="zh-CN" altLang="en-US" sz="1200" b="1" i="0" u="none" strike="noStrike" kern="1200" cap="none" spc="0" normalizeH="0" baseline="0" noProof="0">
@@ -3744,8 +3525,8 @@
               <a:effectLst/>
               <a:uLnTx/>
               <a:uFillTx/>
-              <a:latin typeface="Arial" charset="0"/>
-              <a:ea typeface="华文中宋" charset="0"/>
+              <a:latin typeface="Arial" panose="020B0604020202020204" pitchFamily="34" charset="0"/>
+              <a:ea typeface="华文中宋" panose="02010600040101010101" charset="-122"/>
               <a:cs typeface="+mn-cs"/>
             </a:endParaRPr>
           </a:p>
@@ -3780,7 +3561,6 @@
               <a:buSzTx/>
               <a:buFontTx/>
               <a:buNone/>
-              <a:tabLst/>
               <a:defRPr/>
             </a:pPr>
             <a:fld id="{FD0C70D4-B8A7-1C47-A003-56128FA9BF31}" type="slidenum">
@@ -3796,28 +3576,10 @@
                 <a:effectLst/>
                 <a:uLnTx/>
                 <a:uFillTx/>
-                <a:latin typeface="Arial" charset="0"/>
-                <a:ea typeface="华文中宋" charset="0"/>
+                <a:latin typeface="Arial" panose="020B0604020202020204" pitchFamily="34" charset="0"/>
+                <a:ea typeface="华文中宋" panose="02010600040101010101" charset="-122"/>
                 <a:cs typeface="+mn-cs"/>
               </a:rPr>
-              <a:pPr marL="0" marR="0" lvl="0" indent="0" algn="r" defTabSz="914400" rtl="0" eaLnBrk="0" fontAlgn="base" latinLnBrk="0" hangingPunct="0">
-                <a:lnSpc>
-                  <a:spcPct val="100000"/>
-                </a:lnSpc>
-                <a:spcBef>
-                  <a:spcPct val="0"/>
-                </a:spcBef>
-                <a:spcAft>
-                  <a:spcPct val="0"/>
-                </a:spcAft>
-                <a:buClrTx/>
-                <a:buSzTx/>
-                <a:buFontTx/>
-                <a:buNone/>
-                <a:tabLst/>
-                <a:defRPr/>
-              </a:pPr>
-              <a:t>‹#›</a:t>
             </a:fld>
             <a:endParaRPr kumimoji="0" lang="en-US" altLang="zh-CN" sz="1200" b="1" i="0" u="none" strike="noStrike" kern="1200" cap="none" spc="0" normalizeH="0" baseline="0" noProof="0">
               <a:ln>
@@ -3831,19 +3593,14 @@
               <a:effectLst/>
               <a:uLnTx/>
               <a:uFillTx/>
-              <a:latin typeface="Arial" charset="0"/>
-              <a:ea typeface="华文中宋" charset="0"/>
+              <a:latin typeface="Arial" panose="020B0604020202020204" pitchFamily="34" charset="0"/>
+              <a:ea typeface="华文中宋" panose="02010600040101010101" charset="-122"/>
               <a:cs typeface="+mn-cs"/>
             </a:endParaRPr>
           </a:p>
         </p:txBody>
       </p:sp>
     </p:spTree>
-    <p:extLst>
-      <p:ext uri="{BB962C8B-B14F-4D97-AF65-F5344CB8AC3E}">
-        <p14:creationId xmlns:p14="http://schemas.microsoft.com/office/powerpoint/2010/main" val="166972544"/>
-      </p:ext>
-    </p:extLst>
   </p:cSld>
   <p:clrMapOvr>
     <a:masterClrMapping/>
@@ -3942,7 +3699,6 @@
               <a:buSzTx/>
               <a:buFontTx/>
               <a:buNone/>
-              <a:tabLst/>
               <a:defRPr/>
             </a:pPr>
             <a:fld id="{B41EA215-7A23-544C-A92E-4577682AAD9A}" type="datetimeFigureOut">
@@ -3958,28 +3714,10 @@
                 <a:effectLst/>
                 <a:uLnTx/>
                 <a:uFillTx/>
-                <a:latin typeface="Arial" charset="0"/>
-                <a:ea typeface="华文中宋" charset="0"/>
+                <a:latin typeface="Arial" panose="020B0604020202020204" pitchFamily="34" charset="0"/>
+                <a:ea typeface="华文中宋" panose="02010600040101010101" charset="-122"/>
                 <a:cs typeface="+mn-cs"/>
               </a:rPr>
-              <a:pPr marL="0" marR="0" lvl="0" indent="0" algn="l" defTabSz="914400" rtl="0" eaLnBrk="0" fontAlgn="base" latinLnBrk="0" hangingPunct="0">
-                <a:lnSpc>
-                  <a:spcPct val="100000"/>
-                </a:lnSpc>
-                <a:spcBef>
-                  <a:spcPct val="0"/>
-                </a:spcBef>
-                <a:spcAft>
-                  <a:spcPct val="0"/>
-                </a:spcAft>
-                <a:buClrTx/>
-                <a:buSzTx/>
-                <a:buFontTx/>
-                <a:buNone/>
-                <a:tabLst/>
-                <a:defRPr/>
-              </a:pPr>
-              <a:t>2022/6/9</a:t>
             </a:fld>
             <a:endParaRPr kumimoji="0" lang="zh-CN" altLang="en-US" sz="1200" b="1" i="0" u="none" strike="noStrike" kern="1200" cap="none" spc="0" normalizeH="0" baseline="0" noProof="0">
               <a:ln>
@@ -3993,8 +3731,8 @@
               <a:effectLst/>
               <a:uLnTx/>
               <a:uFillTx/>
-              <a:latin typeface="Arial" charset="0"/>
-              <a:ea typeface="华文中宋" charset="0"/>
+              <a:latin typeface="Arial" panose="020B0604020202020204" pitchFamily="34" charset="0"/>
+              <a:ea typeface="华文中宋" panose="02010600040101010101" charset="-122"/>
               <a:cs typeface="+mn-cs"/>
             </a:endParaRPr>
           </a:p>
@@ -4033,7 +3771,6 @@
               <a:buSzTx/>
               <a:buFontTx/>
               <a:buNone/>
-              <a:tabLst/>
               <a:defRPr/>
             </a:pPr>
             <a:endParaRPr kumimoji="0" lang="zh-CN" altLang="en-US" sz="1200" b="1" i="0" u="none" strike="noStrike" kern="1200" cap="none" spc="0" normalizeH="0" baseline="0" noProof="0">
@@ -4048,8 +3785,8 @@
               <a:effectLst/>
               <a:uLnTx/>
               <a:uFillTx/>
-              <a:latin typeface="Arial" charset="0"/>
-              <a:ea typeface="华文中宋" charset="0"/>
+              <a:latin typeface="Arial" panose="020B0604020202020204" pitchFamily="34" charset="0"/>
+              <a:ea typeface="华文中宋" panose="02010600040101010101" charset="-122"/>
               <a:cs typeface="+mn-cs"/>
             </a:endParaRPr>
           </a:p>
@@ -4088,7 +3825,6 @@
               <a:buSzTx/>
               <a:buFontTx/>
               <a:buNone/>
-              <a:tabLst/>
               <a:defRPr/>
             </a:pPr>
             <a:fld id="{950E2911-4B38-3847-BB6A-657490750D80}" type="slidenum">
@@ -4104,28 +3840,10 @@
                 <a:effectLst/>
                 <a:uLnTx/>
                 <a:uFillTx/>
-                <a:latin typeface="Arial" charset="0"/>
-                <a:ea typeface="华文中宋" charset="0"/>
+                <a:latin typeface="Arial" panose="020B0604020202020204" pitchFamily="34" charset="0"/>
+                <a:ea typeface="华文中宋" panose="02010600040101010101" charset="-122"/>
                 <a:cs typeface="+mn-cs"/>
               </a:rPr>
-              <a:pPr marL="0" marR="0" lvl="0" indent="0" algn="r" defTabSz="914400" rtl="0" eaLnBrk="0" fontAlgn="base" latinLnBrk="0" hangingPunct="0">
-                <a:lnSpc>
-                  <a:spcPct val="100000"/>
-                </a:lnSpc>
-                <a:spcBef>
-                  <a:spcPct val="0"/>
-                </a:spcBef>
-                <a:spcAft>
-                  <a:spcPct val="0"/>
-                </a:spcAft>
-                <a:buClrTx/>
-                <a:buSzTx/>
-                <a:buFontTx/>
-                <a:buNone/>
-                <a:tabLst/>
-                <a:defRPr/>
-              </a:pPr>
-              <a:t>‹#›</a:t>
             </a:fld>
             <a:endParaRPr kumimoji="0" lang="en-US" altLang="zh-CN" sz="1200" b="1" i="0" u="none" strike="noStrike" kern="1200" cap="none" spc="0" normalizeH="0" baseline="0" noProof="0">
               <a:ln>
@@ -4139,19 +3857,14 @@
               <a:effectLst/>
               <a:uLnTx/>
               <a:uFillTx/>
-              <a:latin typeface="Arial" charset="0"/>
-              <a:ea typeface="华文中宋" charset="0"/>
+              <a:latin typeface="Arial" panose="020B0604020202020204" pitchFamily="34" charset="0"/>
+              <a:ea typeface="华文中宋" panose="02010600040101010101" charset="-122"/>
               <a:cs typeface="+mn-cs"/>
             </a:endParaRPr>
           </a:p>
         </p:txBody>
       </p:sp>
     </p:spTree>
-    <p:extLst>
-      <p:ext uri="{BB962C8B-B14F-4D97-AF65-F5344CB8AC3E}">
-        <p14:creationId xmlns:p14="http://schemas.microsoft.com/office/powerpoint/2010/main" val="2746236442"/>
-      </p:ext>
-    </p:extLst>
   </p:cSld>
   <p:clrMapOvr>
     <a:masterClrMapping/>
@@ -4195,6 +3908,7 @@
               <a:rPr lang="zh-CN" altLang="en-US"/>
               <a:t>单击此处编辑母版标题样式</a:t>
             </a:r>
+            <a:endParaRPr lang="zh-CN" altLang="en-US"/>
           </a:p>
         </p:txBody>
       </p:sp>
@@ -4205,7 +3919,7 @@
             <a:spLocks noGrp="1"/>
           </p:cNvSpPr>
           <p:nvPr>
-            <p:ph idx="1"/>
+            <p:ph idx="1" hasCustomPrompt="1"/>
           </p:nvPr>
         </p:nvSpPr>
         <p:spPr/>
@@ -4218,6 +3932,7 @@
               <a:rPr lang="zh-CN" altLang="en-US"/>
               <a:t>编辑母版文本样式</a:t>
             </a:r>
+            <a:endParaRPr lang="zh-CN" altLang="en-US"/>
           </a:p>
           <a:p>
             <a:pPr lvl="1"/>
@@ -4225,6 +3940,7 @@
               <a:rPr lang="zh-CN" altLang="en-US"/>
               <a:t>第二级</a:t>
             </a:r>
+            <a:endParaRPr lang="zh-CN" altLang="en-US"/>
           </a:p>
           <a:p>
             <a:pPr lvl="2"/>
@@ -4232,6 +3948,7 @@
               <a:rPr lang="zh-CN" altLang="en-US"/>
               <a:t>第三级</a:t>
             </a:r>
+            <a:endParaRPr lang="zh-CN" altLang="en-US"/>
           </a:p>
           <a:p>
             <a:pPr lvl="3"/>
@@ -4239,6 +3956,7 @@
               <a:rPr lang="zh-CN" altLang="en-US"/>
               <a:t>第四级</a:t>
             </a:r>
+            <a:endParaRPr lang="zh-CN" altLang="en-US"/>
           </a:p>
           <a:p>
             <a:pPr lvl="4"/>
@@ -4246,6 +3964,7 @@
               <a:rPr lang="zh-CN" altLang="en-US"/>
               <a:t>第五级</a:t>
             </a:r>
+            <a:endParaRPr lang="zh-CN" altLang="en-US"/>
           </a:p>
         </p:txBody>
       </p:sp>
@@ -4266,7 +3985,6 @@
           <a:p>
             <a:fld id="{7FA7C40F-0D87-4C47-A7B0-B93EF7B2BEDD}" type="datetimeFigureOut">
               <a:rPr lang="zh-CN" altLang="en-US" smtClean="0"/>
-              <a:t>2022/6/9</a:t>
             </a:fld>
             <a:endParaRPr lang="zh-CN" altLang="en-US"/>
           </a:p>
@@ -4308,18 +4026,12 @@
           <a:p>
             <a:fld id="{069942B8-D311-4E7D-8579-3E51C69EB101}" type="slidenum">
               <a:rPr lang="zh-CN" altLang="en-US" smtClean="0"/>
-              <a:t>‹#›</a:t>
             </a:fld>
             <a:endParaRPr lang="zh-CN" altLang="en-US"/>
           </a:p>
         </p:txBody>
       </p:sp>
     </p:spTree>
-    <p:extLst>
-      <p:ext uri="{BB962C8B-B14F-4D97-AF65-F5344CB8AC3E}">
-        <p14:creationId xmlns:p14="http://schemas.microsoft.com/office/powerpoint/2010/main" val="1165674180"/>
-      </p:ext>
-    </p:extLst>
   </p:cSld>
   <p:clrMapOvr>
     <a:masterClrMapping/>
@@ -4363,6 +4075,7 @@
               <a:rPr lang="zh-CN" altLang="en-US"/>
               <a:t>单击此处编辑母版标题样式</a:t>
             </a:r>
+            <a:endParaRPr lang="zh-CN" altLang="en-US"/>
           </a:p>
         </p:txBody>
       </p:sp>
@@ -4373,7 +4086,7 @@
             <a:spLocks noGrp="1"/>
           </p:cNvSpPr>
           <p:nvPr>
-            <p:ph sz="half" idx="1"/>
+            <p:ph sz="half" idx="1" hasCustomPrompt="1"/>
           </p:nvPr>
         </p:nvSpPr>
         <p:spPr>
@@ -4391,6 +4104,7 @@
               <a:rPr lang="zh-CN" altLang="en-US"/>
               <a:t>编辑母版文本样式</a:t>
             </a:r>
+            <a:endParaRPr lang="zh-CN" altLang="en-US"/>
           </a:p>
           <a:p>
             <a:pPr lvl="1"/>
@@ -4398,6 +4112,7 @@
               <a:rPr lang="zh-CN" altLang="en-US"/>
               <a:t>第二级</a:t>
             </a:r>
+            <a:endParaRPr lang="zh-CN" altLang="en-US"/>
           </a:p>
           <a:p>
             <a:pPr lvl="2"/>
@@ -4405,6 +4120,7 @@
               <a:rPr lang="zh-CN" altLang="en-US"/>
               <a:t>第三级</a:t>
             </a:r>
+            <a:endParaRPr lang="zh-CN" altLang="en-US"/>
           </a:p>
           <a:p>
             <a:pPr lvl="3"/>
@@ -4412,6 +4128,7 @@
               <a:rPr lang="zh-CN" altLang="en-US"/>
               <a:t>第四级</a:t>
             </a:r>
+            <a:endParaRPr lang="zh-CN" altLang="en-US"/>
           </a:p>
           <a:p>
             <a:pPr lvl="4"/>
@@ -4419,6 +4136,7 @@
               <a:rPr lang="zh-CN" altLang="en-US"/>
               <a:t>第五级</a:t>
             </a:r>
+            <a:endParaRPr lang="zh-CN" altLang="en-US"/>
           </a:p>
         </p:txBody>
       </p:sp>
@@ -4429,7 +4147,7 @@
             <a:spLocks noGrp="1"/>
           </p:cNvSpPr>
           <p:nvPr>
-            <p:ph sz="half" idx="2"/>
+            <p:ph sz="half" idx="2" hasCustomPrompt="1"/>
           </p:nvPr>
         </p:nvSpPr>
         <p:spPr>
@@ -4447,6 +4165,7 @@
               <a:rPr lang="zh-CN" altLang="en-US"/>
               <a:t>编辑母版文本样式</a:t>
             </a:r>
+            <a:endParaRPr lang="zh-CN" altLang="en-US"/>
           </a:p>
           <a:p>
             <a:pPr lvl="1"/>
@@ -4454,6 +4173,7 @@
               <a:rPr lang="zh-CN" altLang="en-US"/>
               <a:t>第二级</a:t>
             </a:r>
+            <a:endParaRPr lang="zh-CN" altLang="en-US"/>
           </a:p>
           <a:p>
             <a:pPr lvl="2"/>
@@ -4461,6 +4181,7 @@
               <a:rPr lang="zh-CN" altLang="en-US"/>
               <a:t>第三级</a:t>
             </a:r>
+            <a:endParaRPr lang="zh-CN" altLang="en-US"/>
           </a:p>
           <a:p>
             <a:pPr lvl="3"/>
@@ -4468,6 +4189,7 @@
               <a:rPr lang="zh-CN" altLang="en-US"/>
               <a:t>第四级</a:t>
             </a:r>
+            <a:endParaRPr lang="zh-CN" altLang="en-US"/>
           </a:p>
           <a:p>
             <a:pPr lvl="4"/>
@@ -4475,6 +4197,7 @@
               <a:rPr lang="zh-CN" altLang="en-US"/>
               <a:t>第五级</a:t>
             </a:r>
+            <a:endParaRPr lang="zh-CN" altLang="en-US"/>
           </a:p>
         </p:txBody>
       </p:sp>
@@ -4495,7 +4218,6 @@
           <a:p>
             <a:fld id="{7FA7C40F-0D87-4C47-A7B0-B93EF7B2BEDD}" type="datetimeFigureOut">
               <a:rPr lang="zh-CN" altLang="en-US" smtClean="0"/>
-              <a:t>2022/6/9</a:t>
             </a:fld>
             <a:endParaRPr lang="zh-CN" altLang="en-US"/>
           </a:p>
@@ -4537,18 +4259,12 @@
           <a:p>
             <a:fld id="{069942B8-D311-4E7D-8579-3E51C69EB101}" type="slidenum">
               <a:rPr lang="zh-CN" altLang="en-US" smtClean="0"/>
-              <a:t>‹#›</a:t>
             </a:fld>
             <a:endParaRPr lang="zh-CN" altLang="en-US"/>
           </a:p>
         </p:txBody>
       </p:sp>
     </p:spTree>
-    <p:extLst>
-      <p:ext uri="{BB962C8B-B14F-4D97-AF65-F5344CB8AC3E}">
-        <p14:creationId xmlns:p14="http://schemas.microsoft.com/office/powerpoint/2010/main" val="749575922"/>
-      </p:ext>
-    </p:extLst>
   </p:cSld>
   <p:clrMapOvr>
     <a:masterClrMapping/>
@@ -4641,6 +4357,7 @@
               <a:rPr lang="zh-CN" altLang="en-US"/>
               <a:t>编辑母版文本样式</a:t>
             </a:r>
+            <a:endParaRPr lang="zh-CN" altLang="en-US"/>
           </a:p>
           <a:p>
             <a:pPr lvl="1"/>
@@ -4648,6 +4365,7 @@
               <a:rPr lang="zh-CN" altLang="en-US"/>
               <a:t>第二级</a:t>
             </a:r>
+            <a:endParaRPr lang="zh-CN" altLang="en-US"/>
           </a:p>
           <a:p>
             <a:pPr lvl="2"/>
@@ -4655,6 +4373,7 @@
               <a:rPr lang="zh-CN" altLang="en-US"/>
               <a:t>第三级</a:t>
             </a:r>
+            <a:endParaRPr lang="zh-CN" altLang="en-US"/>
           </a:p>
           <a:p>
             <a:pPr lvl="3"/>
@@ -4662,6 +4381,7 @@
               <a:rPr lang="zh-CN" altLang="en-US"/>
               <a:t>第四级</a:t>
             </a:r>
+            <a:endParaRPr lang="zh-CN" altLang="en-US"/>
           </a:p>
           <a:p>
             <a:pPr lvl="4"/>
@@ -4720,7 +4440,6 @@
               <a:buSzTx/>
               <a:buFontTx/>
               <a:buNone/>
-              <a:tabLst/>
               <a:defRPr/>
             </a:pPr>
             <a:fld id="{63C5E0C2-28B8-CE44-9D60-588CFEE87B31}" type="datetimeFigureOut">
@@ -4736,28 +4455,10 @@
                 <a:effectLst/>
                 <a:uLnTx/>
                 <a:uFillTx/>
-                <a:latin typeface="Arial" charset="0"/>
-                <a:ea typeface="华文中宋" charset="0"/>
+                <a:latin typeface="Arial" panose="020B0604020202020204" pitchFamily="34" charset="0"/>
+                <a:ea typeface="华文中宋" panose="02010600040101010101" charset="-122"/>
                 <a:cs typeface="+mn-cs"/>
               </a:rPr>
-              <a:pPr marL="0" marR="0" lvl="0" indent="0" algn="l" defTabSz="914400" rtl="0" eaLnBrk="0" fontAlgn="base" latinLnBrk="0" hangingPunct="0">
-                <a:lnSpc>
-                  <a:spcPct val="100000"/>
-                </a:lnSpc>
-                <a:spcBef>
-                  <a:spcPct val="0"/>
-                </a:spcBef>
-                <a:spcAft>
-                  <a:spcPct val="0"/>
-                </a:spcAft>
-                <a:buClrTx/>
-                <a:buSzTx/>
-                <a:buFontTx/>
-                <a:buNone/>
-                <a:tabLst/>
-                <a:defRPr/>
-              </a:pPr>
-              <a:t>2022/6/9</a:t>
             </a:fld>
             <a:endParaRPr kumimoji="0" lang="zh-CN" altLang="en-US" sz="1200" b="1" i="0" u="none" strike="noStrike" kern="1200" cap="none" spc="0" normalizeH="0" baseline="0" noProof="0">
               <a:ln>
@@ -4771,8 +4472,8 @@
               <a:effectLst/>
               <a:uLnTx/>
               <a:uFillTx/>
-              <a:latin typeface="Arial" charset="0"/>
-              <a:ea typeface="华文中宋" charset="0"/>
+              <a:latin typeface="Arial" panose="020B0604020202020204" pitchFamily="34" charset="0"/>
+              <a:ea typeface="华文中宋" panose="02010600040101010101" charset="-122"/>
               <a:cs typeface="+mn-cs"/>
             </a:endParaRPr>
           </a:p>
@@ -4825,7 +4526,6 @@
               <a:buSzTx/>
               <a:buFontTx/>
               <a:buNone/>
-              <a:tabLst/>
               <a:defRPr/>
             </a:pPr>
             <a:endParaRPr kumimoji="0" lang="zh-CN" altLang="en-US" sz="1200" b="1" i="0" u="none" strike="noStrike" kern="1200" cap="none" spc="0" normalizeH="0" baseline="0" noProof="0">
@@ -4840,8 +4540,8 @@
               <a:effectLst/>
               <a:uLnTx/>
               <a:uFillTx/>
-              <a:latin typeface="Arial" charset="0"/>
-              <a:ea typeface="华文中宋" charset="0"/>
+              <a:latin typeface="Arial" panose="020B0604020202020204" pitchFamily="34" charset="0"/>
+              <a:ea typeface="华文中宋" panose="02010600040101010101" charset="-122"/>
               <a:cs typeface="+mn-cs"/>
             </a:endParaRPr>
           </a:p>
@@ -4894,7 +4594,6 @@
               <a:buSzTx/>
               <a:buFontTx/>
               <a:buNone/>
-              <a:tabLst/>
               <a:defRPr/>
             </a:pPr>
             <a:fld id="{41093995-55F8-9440-9010-524D68AC1856}" type="slidenum">
@@ -4910,28 +4609,10 @@
                 <a:effectLst/>
                 <a:uLnTx/>
                 <a:uFillTx/>
-                <a:latin typeface="Arial" charset="0"/>
-                <a:ea typeface="华文中宋" charset="0"/>
+                <a:latin typeface="Arial" panose="020B0604020202020204" pitchFamily="34" charset="0"/>
+                <a:ea typeface="华文中宋" panose="02010600040101010101" charset="-122"/>
                 <a:cs typeface="+mn-cs"/>
               </a:rPr>
-              <a:pPr marL="0" marR="0" lvl="0" indent="0" algn="r" defTabSz="914400" rtl="0" eaLnBrk="0" fontAlgn="base" latinLnBrk="0" hangingPunct="0">
-                <a:lnSpc>
-                  <a:spcPct val="100000"/>
-                </a:lnSpc>
-                <a:spcBef>
-                  <a:spcPct val="0"/>
-                </a:spcBef>
-                <a:spcAft>
-                  <a:spcPct val="0"/>
-                </a:spcAft>
-                <a:buClrTx/>
-                <a:buSzTx/>
-                <a:buFontTx/>
-                <a:buNone/>
-                <a:tabLst/>
-                <a:defRPr/>
-              </a:pPr>
-              <a:t>‹#›</a:t>
             </a:fld>
             <a:endParaRPr kumimoji="0" lang="en-US" altLang="zh-CN" sz="1200" b="1" i="0" u="none" strike="noStrike" kern="1200" cap="none" spc="0" normalizeH="0" baseline="0" noProof="0">
               <a:ln>
@@ -4945,29 +4626,24 @@
               <a:effectLst/>
               <a:uLnTx/>
               <a:uFillTx/>
-              <a:latin typeface="Arial" charset="0"/>
-              <a:ea typeface="华文中宋" charset="0"/>
+              <a:latin typeface="Arial" panose="020B0604020202020204" pitchFamily="34" charset="0"/>
+              <a:ea typeface="华文中宋" panose="02010600040101010101" charset="-122"/>
               <a:cs typeface="+mn-cs"/>
             </a:endParaRPr>
           </a:p>
         </p:txBody>
       </p:sp>
     </p:spTree>
-    <p:extLst>
-      <p:ext uri="{BB962C8B-B14F-4D97-AF65-F5344CB8AC3E}">
-        <p14:creationId xmlns:p14="http://schemas.microsoft.com/office/powerpoint/2010/main" val="3675512164"/>
-      </p:ext>
-    </p:extLst>
   </p:cSld>
   <p:clrMap bg1="lt1" tx1="dk1" bg2="lt2" tx2="dk2" accent1="accent1" accent2="accent2" accent3="accent3" accent4="accent4" accent5="accent5" accent6="accent6" hlink="hlink" folHlink="folHlink"/>
   <p:sldLayoutIdLst>
-    <p:sldLayoutId id="2147483661" r:id="rId1"/>
-    <p:sldLayoutId id="2147483662" r:id="rId2"/>
-    <p:sldLayoutId id="2147483663" r:id="rId3"/>
-    <p:sldLayoutId id="2147483664" r:id="rId4"/>
-    <p:sldLayoutId id="2147483665" r:id="rId5"/>
-    <p:sldLayoutId id="2147483675" r:id="rId6"/>
-    <p:sldLayoutId id="2147483677" r:id="rId7"/>
+    <p:sldLayoutId id="2147483649" r:id="rId1"/>
+    <p:sldLayoutId id="2147483650" r:id="rId2"/>
+    <p:sldLayoutId id="2147483651" r:id="rId3"/>
+    <p:sldLayoutId id="2147483652" r:id="rId4"/>
+    <p:sldLayoutId id="2147483653" r:id="rId5"/>
+    <p:sldLayoutId id="2147483654" r:id="rId6"/>
+    <p:sldLayoutId id="2147483655" r:id="rId7"/>
   </p:sldLayoutIdLst>
   <p:txStyles>
     <p:titleStyle>
@@ -5258,13 +4934,8 @@
     <p:bg>
       <p:bgPr>
         <a:blipFill dpi="0" rotWithShape="0">
-          <a:blip r:embed="rId3" cstate="hqprint">
+          <a:blip r:embed="rId1" cstate="hqprint">
             <a:lum/>
-            <a:extLst>
-              <a:ext uri="{28A0092B-C50C-407E-A947-70E740481C1C}">
-                <a14:useLocalDpi xmlns:a14="http://schemas.microsoft.com/office/drawing/2010/main"/>
-              </a:ext>
-            </a:extLst>
           </a:blip>
           <a:srcRect/>
           <a:stretch>
@@ -5345,7 +5016,6 @@
               <a:buSzTx/>
               <a:buFontTx/>
               <a:buNone/>
-              <a:tabLst/>
               <a:defRPr/>
             </a:pPr>
             <a:endParaRPr kumimoji="0" lang="zh-CN" altLang="en-US" sz="2000" b="1" i="0" u="none" strike="noStrike" kern="1200" cap="none" spc="0" normalizeH="0" baseline="0" noProof="0" dirty="0">
@@ -5360,8 +5030,8 @@
               <a:effectLst/>
               <a:uLnTx/>
               <a:uFillTx/>
-              <a:latin typeface="Arial"/>
-              <a:ea typeface="微软雅黑"/>
+              <a:latin typeface="Arial" panose="020B0604020202020204"/>
+              <a:ea typeface="微软雅黑" panose="020B0503020204020204" charset="-122"/>
               <a:cs typeface="+mn-cs"/>
             </a:endParaRPr>
           </a:p>
@@ -5391,6 +5061,7 @@
               <a:rPr lang="zh-CN" altLang="en-US" b="1" dirty="0"/>
               <a:t>论文阅读</a:t>
             </a:r>
+            <a:endParaRPr lang="zh-CN" altLang="en-US" b="1" dirty="0"/>
           </a:p>
         </p:txBody>
       </p:sp>
@@ -5420,6 +5091,7 @@
               <a:rPr lang="zh-CN" altLang="en-US" sz="2800" dirty="0"/>
               <a:t>刘宗鑫</a:t>
             </a:r>
+            <a:endParaRPr lang="zh-CN" altLang="en-US" sz="2800" dirty="0"/>
           </a:p>
         </p:txBody>
       </p:sp>
@@ -5432,13 +5104,7 @@
           <p:nvPr/>
         </p:nvPicPr>
         <p:blipFill>
-          <a:blip r:embed="rId4" cstate="screen">
-            <a:extLst>
-              <a:ext uri="{28A0092B-C50C-407E-A947-70E740481C1C}">
-                <a14:useLocalDpi xmlns:a14="http://schemas.microsoft.com/office/drawing/2010/main"/>
-              </a:ext>
-            </a:extLst>
-          </a:blip>
+          <a:blip r:embed="rId2" cstate="screen"/>
           <a:srcRect/>
           <a:stretch>
             <a:fillRect/>
@@ -5478,11 +5144,6 @@
         </p:spPr>
       </p:pic>
     </p:spTree>
-    <p:extLst>
-      <p:ext uri="{BB962C8B-B14F-4D97-AF65-F5344CB8AC3E}">
-        <p14:creationId xmlns:p14="http://schemas.microsoft.com/office/powerpoint/2010/main" val="648486646"/>
-      </p:ext>
-    </p:extLst>
   </p:cSld>
   <p:clrMapOvr>
     <a:masterClrMapping/>
@@ -5511,9 +5172,7 @@
       <p:sp>
         <p:nvSpPr>
           <p:cNvPr id="14338" name="Freeform 11"/>
-          <p:cNvSpPr>
-            <a:spLocks/>
-          </p:cNvSpPr>
+          <p:cNvSpPr/>
           <p:nvPr/>
         </p:nvSpPr>
         <p:spPr bwMode="auto">
@@ -5588,8 +5247,6 @@
                   <a:srgbClr val="000000"/>
                 </a:solidFill>
                 <a:round/>
-                <a:headEnd/>
-                <a:tailEnd/>
               </a14:hiddenLine>
             </a:ext>
           </a:extLst>
@@ -5598,7 +5255,7 @@
           <a:bodyPr/>
           <a:lstStyle/>
           <a:p>
-            <a:pPr marL="0" marR="0" lvl="0" indent="0" algn="l" defTabSz="914034" rtl="0" eaLnBrk="1" fontAlgn="base" latinLnBrk="0" hangingPunct="1">
+            <a:pPr marL="0" marR="0" lvl="0" indent="0" algn="l" defTabSz="913765" rtl="0" eaLnBrk="1" fontAlgn="base" latinLnBrk="0" hangingPunct="1">
               <a:lnSpc>
                 <a:spcPct val="100000"/>
               </a:lnSpc>
@@ -5612,10 +5269,9 @@
               <a:buSzTx/>
               <a:buFontTx/>
               <a:buNone/>
-              <a:tabLst/>
               <a:defRPr/>
             </a:pPr>
-            <a:endParaRPr kumimoji="0" lang="zh-CN" altLang="en-US" sz="1799" b="0" i="0" u="none" strike="noStrike" kern="1200" cap="none" spc="0" normalizeH="0" baseline="0" noProof="0">
+            <a:endParaRPr kumimoji="0" lang="zh-CN" altLang="en-US" sz="1800" b="0" i="0" u="none" strike="noStrike" kern="1200" cap="none" spc="0" normalizeH="0" baseline="0" noProof="0">
               <a:ln>
                 <a:noFill/>
               </a:ln>
@@ -5635,9 +5291,7 @@
       <p:sp>
         <p:nvSpPr>
           <p:cNvPr id="14339" name="Freeform 10"/>
-          <p:cNvSpPr>
-            <a:spLocks/>
-          </p:cNvSpPr>
+          <p:cNvSpPr/>
           <p:nvPr/>
         </p:nvSpPr>
         <p:spPr bwMode="auto">
@@ -5745,15 +5399,13 @@
               <a:srgbClr val="A8A9AD"/>
             </a:solidFill>
             <a:round/>
-            <a:headEnd/>
-            <a:tailEnd/>
           </a:ln>
         </p:spPr>
         <p:txBody>
           <a:bodyPr/>
           <a:lstStyle/>
           <a:p>
-            <a:pPr marL="0" marR="0" lvl="0" indent="0" algn="l" defTabSz="914034" rtl="0" eaLnBrk="1" fontAlgn="base" latinLnBrk="0" hangingPunct="1">
+            <a:pPr marL="0" marR="0" lvl="0" indent="0" algn="l" defTabSz="913765" rtl="0" eaLnBrk="1" fontAlgn="base" latinLnBrk="0" hangingPunct="1">
               <a:lnSpc>
                 <a:spcPct val="100000"/>
               </a:lnSpc>
@@ -5767,10 +5419,9 @@
               <a:buSzTx/>
               <a:buFontTx/>
               <a:buNone/>
-              <a:tabLst/>
               <a:defRPr/>
             </a:pPr>
-            <a:endParaRPr kumimoji="0" lang="zh-CN" altLang="en-US" sz="1799" b="0" i="0" u="none" strike="noStrike" kern="1200" cap="none" spc="0" normalizeH="0" baseline="0" noProof="0">
+            <a:endParaRPr kumimoji="0" lang="zh-CN" altLang="en-US" sz="1800" b="0" i="0" u="none" strike="noStrike" kern="1200" cap="none" spc="0" normalizeH="0" baseline="0" noProof="0">
               <a:ln>
                 <a:noFill/>
               </a:ln>
@@ -5924,7 +5575,7 @@
             </a:lvl9pPr>
           </a:lstStyle>
           <a:p>
-            <a:pPr marL="0" marR="0" lvl="0" indent="0" algn="l" defTabSz="914034" rtl="0" eaLnBrk="1" fontAlgn="base" latinLnBrk="0" hangingPunct="1">
+            <a:pPr marL="0" marR="0" lvl="0" indent="0" algn="l" defTabSz="913765" rtl="0" eaLnBrk="1" fontAlgn="base" latinLnBrk="0" hangingPunct="1">
               <a:lnSpc>
                 <a:spcPct val="100000"/>
               </a:lnSpc>
@@ -5938,10 +5589,9 @@
               <a:buSzTx/>
               <a:buFontTx/>
               <a:buNone/>
-              <a:tabLst/>
               <a:defRPr/>
             </a:pPr>
-            <a:endParaRPr kumimoji="0" lang="zh-CN" altLang="en-US" sz="1799" b="0" i="0" u="none" strike="noStrike" kern="1200" cap="none" spc="0" normalizeH="0" baseline="0" noProof="0">
+            <a:endParaRPr kumimoji="0" lang="zh-CN" altLang="en-US" sz="1800" b="0" i="0" u="none" strike="noStrike" kern="1200" cap="none" spc="0" normalizeH="0" baseline="0" noProof="0">
               <a:ln>
                 <a:noFill/>
               </a:ln>
@@ -5961,9 +5611,7 @@
       <p:sp>
         <p:nvSpPr>
           <p:cNvPr id="14341" name="Freeform 11"/>
-          <p:cNvSpPr>
-            <a:spLocks/>
-          </p:cNvSpPr>
+          <p:cNvSpPr/>
           <p:nvPr/>
         </p:nvSpPr>
         <p:spPr bwMode="auto">
@@ -6038,8 +5686,6 @@
                   <a:srgbClr val="000000"/>
                 </a:solidFill>
                 <a:round/>
-                <a:headEnd/>
-                <a:tailEnd/>
               </a14:hiddenLine>
             </a:ext>
           </a:extLst>
@@ -6048,7 +5694,7 @@
           <a:bodyPr/>
           <a:lstStyle/>
           <a:p>
-            <a:pPr marL="0" marR="0" lvl="0" indent="0" algn="l" defTabSz="914034" rtl="0" eaLnBrk="1" fontAlgn="base" latinLnBrk="0" hangingPunct="1">
+            <a:pPr marL="0" marR="0" lvl="0" indent="0" algn="l" defTabSz="913765" rtl="0" eaLnBrk="1" fontAlgn="base" latinLnBrk="0" hangingPunct="1">
               <a:lnSpc>
                 <a:spcPct val="100000"/>
               </a:lnSpc>
@@ -6062,10 +5708,9 @@
               <a:buSzTx/>
               <a:buFontTx/>
               <a:buNone/>
-              <a:tabLst/>
               <a:defRPr/>
             </a:pPr>
-            <a:endParaRPr kumimoji="0" lang="zh-CN" altLang="en-US" sz="1799" b="0" i="0" u="none" strike="noStrike" kern="1200" cap="none" spc="0" normalizeH="0" baseline="0" noProof="0">
+            <a:endParaRPr kumimoji="0" lang="zh-CN" altLang="en-US" sz="1800" b="0" i="0" u="none" strike="noStrike" kern="1200" cap="none" spc="0" normalizeH="0" baseline="0" noProof="0">
               <a:ln>
                 <a:noFill/>
               </a:ln>
@@ -6085,9 +5730,7 @@
       <p:sp>
         <p:nvSpPr>
           <p:cNvPr id="14342" name="Freeform 10"/>
-          <p:cNvSpPr>
-            <a:spLocks/>
-          </p:cNvSpPr>
+          <p:cNvSpPr/>
           <p:nvPr/>
         </p:nvSpPr>
         <p:spPr bwMode="auto">
@@ -6195,15 +5838,13 @@
               <a:srgbClr val="A8A9AD"/>
             </a:solidFill>
             <a:round/>
-            <a:headEnd/>
-            <a:tailEnd/>
           </a:ln>
         </p:spPr>
         <p:txBody>
           <a:bodyPr/>
           <a:lstStyle/>
           <a:p>
-            <a:pPr marL="0" marR="0" lvl="0" indent="0" algn="l" defTabSz="914034" rtl="0" eaLnBrk="1" fontAlgn="base" latinLnBrk="0" hangingPunct="1">
+            <a:pPr marL="0" marR="0" lvl="0" indent="0" algn="l" defTabSz="913765" rtl="0" eaLnBrk="1" fontAlgn="base" latinLnBrk="0" hangingPunct="1">
               <a:lnSpc>
                 <a:spcPct val="100000"/>
               </a:lnSpc>
@@ -6217,10 +5858,9 @@
               <a:buSzTx/>
               <a:buFontTx/>
               <a:buNone/>
-              <a:tabLst/>
               <a:defRPr/>
             </a:pPr>
-            <a:endParaRPr kumimoji="0" lang="zh-CN" altLang="en-US" sz="1799" b="0" i="0" u="none" strike="noStrike" kern="1200" cap="none" spc="0" normalizeH="0" baseline="0" noProof="0">
+            <a:endParaRPr kumimoji="0" lang="zh-CN" altLang="en-US" sz="1800" b="0" i="0" u="none" strike="noStrike" kern="1200" cap="none" spc="0" normalizeH="0" baseline="0" noProof="0">
               <a:ln>
                 <a:noFill/>
               </a:ln>
@@ -6374,7 +6014,7 @@
             </a:lvl9pPr>
           </a:lstStyle>
           <a:p>
-            <a:pPr marL="0" marR="0" lvl="0" indent="0" algn="l" defTabSz="914034" rtl="0" eaLnBrk="1" fontAlgn="base" latinLnBrk="0" hangingPunct="1">
+            <a:pPr marL="0" marR="0" lvl="0" indent="0" algn="l" defTabSz="913765" rtl="0" eaLnBrk="1" fontAlgn="base" latinLnBrk="0" hangingPunct="1">
               <a:lnSpc>
                 <a:spcPct val="100000"/>
               </a:lnSpc>
@@ -6388,10 +6028,9 @@
               <a:buSzTx/>
               <a:buFontTx/>
               <a:buNone/>
-              <a:tabLst/>
               <a:defRPr/>
             </a:pPr>
-            <a:endParaRPr kumimoji="0" lang="zh-CN" altLang="en-US" sz="1799" b="0" i="0" u="none" strike="noStrike" kern="1200" cap="none" spc="0" normalizeH="0" baseline="0" noProof="0">
+            <a:endParaRPr kumimoji="0" lang="zh-CN" altLang="en-US" sz="1800" b="0" i="0" u="none" strike="noStrike" kern="1200" cap="none" spc="0" normalizeH="0" baseline="0" noProof="0">
               <a:ln>
                 <a:noFill/>
               </a:ln>
@@ -6411,9 +6050,7 @@
       <p:sp>
         <p:nvSpPr>
           <p:cNvPr id="14344" name="Freeform 11"/>
-          <p:cNvSpPr>
-            <a:spLocks/>
-          </p:cNvSpPr>
+          <p:cNvSpPr/>
           <p:nvPr/>
         </p:nvSpPr>
         <p:spPr bwMode="auto">
@@ -6488,8 +6125,6 @@
                   <a:srgbClr val="000000"/>
                 </a:solidFill>
                 <a:round/>
-                <a:headEnd/>
-                <a:tailEnd/>
               </a14:hiddenLine>
             </a:ext>
           </a:extLst>
@@ -6498,7 +6133,7 @@
           <a:bodyPr/>
           <a:lstStyle/>
           <a:p>
-            <a:pPr marL="0" marR="0" lvl="0" indent="0" algn="l" defTabSz="914034" rtl="0" eaLnBrk="1" fontAlgn="base" latinLnBrk="0" hangingPunct="1">
+            <a:pPr marL="0" marR="0" lvl="0" indent="0" algn="l" defTabSz="913765" rtl="0" eaLnBrk="1" fontAlgn="base" latinLnBrk="0" hangingPunct="1">
               <a:lnSpc>
                 <a:spcPct val="100000"/>
               </a:lnSpc>
@@ -6512,10 +6147,9 @@
               <a:buSzTx/>
               <a:buFontTx/>
               <a:buNone/>
-              <a:tabLst/>
               <a:defRPr/>
             </a:pPr>
-            <a:endParaRPr kumimoji="0" lang="zh-CN" altLang="en-US" sz="1799" b="0" i="0" u="none" strike="noStrike" kern="1200" cap="none" spc="0" normalizeH="0" baseline="0" noProof="0">
+            <a:endParaRPr kumimoji="0" lang="zh-CN" altLang="en-US" sz="1800" b="0" i="0" u="none" strike="noStrike" kern="1200" cap="none" spc="0" normalizeH="0" baseline="0" noProof="0">
               <a:ln>
                 <a:noFill/>
               </a:ln>
@@ -6535,9 +6169,7 @@
       <p:sp>
         <p:nvSpPr>
           <p:cNvPr id="14345" name="Freeform 10"/>
-          <p:cNvSpPr>
-            <a:spLocks/>
-          </p:cNvSpPr>
+          <p:cNvSpPr/>
           <p:nvPr/>
         </p:nvSpPr>
         <p:spPr bwMode="auto">
@@ -6645,15 +6277,13 @@
               <a:srgbClr val="A8A9AD"/>
             </a:solidFill>
             <a:round/>
-            <a:headEnd/>
-            <a:tailEnd/>
           </a:ln>
         </p:spPr>
         <p:txBody>
           <a:bodyPr/>
           <a:lstStyle/>
           <a:p>
-            <a:pPr marL="0" marR="0" lvl="0" indent="0" algn="l" defTabSz="914034" rtl="0" eaLnBrk="1" fontAlgn="base" latinLnBrk="0" hangingPunct="1">
+            <a:pPr marL="0" marR="0" lvl="0" indent="0" algn="l" defTabSz="913765" rtl="0" eaLnBrk="1" fontAlgn="base" latinLnBrk="0" hangingPunct="1">
               <a:lnSpc>
                 <a:spcPct val="100000"/>
               </a:lnSpc>
@@ -6667,10 +6297,9 @@
               <a:buSzTx/>
               <a:buFontTx/>
               <a:buNone/>
-              <a:tabLst/>
               <a:defRPr/>
             </a:pPr>
-            <a:endParaRPr kumimoji="0" lang="zh-CN" altLang="en-US" sz="1799" b="0" i="0" u="none" strike="noStrike" kern="1200" cap="none" spc="0" normalizeH="0" baseline="0" noProof="0">
+            <a:endParaRPr kumimoji="0" lang="zh-CN" altLang="en-US" sz="1800" b="0" i="0" u="none" strike="noStrike" kern="1200" cap="none" spc="0" normalizeH="0" baseline="0" noProof="0">
               <a:ln>
                 <a:noFill/>
               </a:ln>
@@ -6824,7 +6453,7 @@
             </a:lvl9pPr>
           </a:lstStyle>
           <a:p>
-            <a:pPr marL="0" marR="0" lvl="0" indent="0" algn="l" defTabSz="914034" rtl="0" eaLnBrk="1" fontAlgn="base" latinLnBrk="0" hangingPunct="1">
+            <a:pPr marL="0" marR="0" lvl="0" indent="0" algn="l" defTabSz="913765" rtl="0" eaLnBrk="1" fontAlgn="base" latinLnBrk="0" hangingPunct="1">
               <a:lnSpc>
                 <a:spcPct val="100000"/>
               </a:lnSpc>
@@ -6838,10 +6467,9 @@
               <a:buSzTx/>
               <a:buFontTx/>
               <a:buNone/>
-              <a:tabLst/>
               <a:defRPr/>
             </a:pPr>
-            <a:endParaRPr kumimoji="0" lang="zh-CN" altLang="en-US" sz="1799" b="0" i="0" u="none" strike="noStrike" kern="1200" cap="none" spc="0" normalizeH="0" baseline="0" noProof="0">
+            <a:endParaRPr kumimoji="0" lang="zh-CN" altLang="en-US" sz="1800" b="0" i="0" u="none" strike="noStrike" kern="1200" cap="none" spc="0" normalizeH="0" baseline="0" noProof="0">
               <a:ln>
                 <a:noFill/>
               </a:ln>
@@ -6861,9 +6489,7 @@
       <p:sp>
         <p:nvSpPr>
           <p:cNvPr id="14347" name="Freeform 11"/>
-          <p:cNvSpPr>
-            <a:spLocks/>
-          </p:cNvSpPr>
+          <p:cNvSpPr/>
           <p:nvPr/>
         </p:nvSpPr>
         <p:spPr bwMode="auto">
@@ -6938,8 +6564,6 @@
                   <a:srgbClr val="000000"/>
                 </a:solidFill>
                 <a:round/>
-                <a:headEnd/>
-                <a:tailEnd/>
               </a14:hiddenLine>
             </a:ext>
           </a:extLst>
@@ -6948,7 +6572,7 @@
           <a:bodyPr/>
           <a:lstStyle/>
           <a:p>
-            <a:pPr marL="0" marR="0" lvl="0" indent="0" algn="l" defTabSz="914034" rtl="0" eaLnBrk="1" fontAlgn="base" latinLnBrk="0" hangingPunct="1">
+            <a:pPr marL="0" marR="0" lvl="0" indent="0" algn="l" defTabSz="913765" rtl="0" eaLnBrk="1" fontAlgn="base" latinLnBrk="0" hangingPunct="1">
               <a:lnSpc>
                 <a:spcPct val="100000"/>
               </a:lnSpc>
@@ -6962,10 +6586,9 @@
               <a:buSzTx/>
               <a:buFontTx/>
               <a:buNone/>
-              <a:tabLst/>
               <a:defRPr/>
             </a:pPr>
-            <a:endParaRPr kumimoji="0" lang="zh-CN" altLang="en-US" sz="1799" b="0" i="0" u="none" strike="noStrike" kern="1200" cap="none" spc="0" normalizeH="0" baseline="0" noProof="0">
+            <a:endParaRPr kumimoji="0" lang="zh-CN" altLang="en-US" sz="1800" b="0" i="0" u="none" strike="noStrike" kern="1200" cap="none" spc="0" normalizeH="0" baseline="0" noProof="0">
               <a:ln>
                 <a:noFill/>
               </a:ln>
@@ -6985,9 +6608,7 @@
       <p:sp>
         <p:nvSpPr>
           <p:cNvPr id="14348" name="Freeform 10"/>
-          <p:cNvSpPr>
-            <a:spLocks/>
-          </p:cNvSpPr>
+          <p:cNvSpPr/>
           <p:nvPr/>
         </p:nvSpPr>
         <p:spPr bwMode="auto">
@@ -7095,15 +6716,13 @@
               <a:srgbClr val="A8A9AD"/>
             </a:solidFill>
             <a:round/>
-            <a:headEnd/>
-            <a:tailEnd/>
           </a:ln>
         </p:spPr>
         <p:txBody>
           <a:bodyPr/>
           <a:lstStyle/>
           <a:p>
-            <a:pPr marL="0" marR="0" lvl="0" indent="0" algn="l" defTabSz="914034" rtl="0" eaLnBrk="1" fontAlgn="base" latinLnBrk="0" hangingPunct="1">
+            <a:pPr marL="0" marR="0" lvl="0" indent="0" algn="l" defTabSz="913765" rtl="0" eaLnBrk="1" fontAlgn="base" latinLnBrk="0" hangingPunct="1">
               <a:lnSpc>
                 <a:spcPct val="100000"/>
               </a:lnSpc>
@@ -7117,10 +6736,9 @@
               <a:buSzTx/>
               <a:buFontTx/>
               <a:buNone/>
-              <a:tabLst/>
               <a:defRPr/>
             </a:pPr>
-            <a:endParaRPr kumimoji="0" lang="zh-CN" altLang="en-US" sz="1799" b="0" i="0" u="none" strike="noStrike" kern="1200" cap="none" spc="0" normalizeH="0" baseline="0" noProof="0">
+            <a:endParaRPr kumimoji="0" lang="zh-CN" altLang="en-US" sz="1800" b="0" i="0" u="none" strike="noStrike" kern="1200" cap="none" spc="0" normalizeH="0" baseline="0" noProof="0">
               <a:ln>
                 <a:noFill/>
               </a:ln>
@@ -7274,7 +6892,7 @@
             </a:lvl9pPr>
           </a:lstStyle>
           <a:p>
-            <a:pPr marL="0" marR="0" lvl="0" indent="0" algn="l" defTabSz="914034" rtl="0" eaLnBrk="1" fontAlgn="base" latinLnBrk="0" hangingPunct="1">
+            <a:pPr marL="0" marR="0" lvl="0" indent="0" algn="l" defTabSz="913765" rtl="0" eaLnBrk="1" fontAlgn="base" latinLnBrk="0" hangingPunct="1">
               <a:lnSpc>
                 <a:spcPct val="100000"/>
               </a:lnSpc>
@@ -7288,10 +6906,9 @@
               <a:buSzTx/>
               <a:buFontTx/>
               <a:buNone/>
-              <a:tabLst/>
               <a:defRPr/>
             </a:pPr>
-            <a:endParaRPr kumimoji="0" lang="zh-CN" altLang="en-US" sz="1799" b="0" i="0" u="none" strike="noStrike" kern="1200" cap="none" spc="0" normalizeH="0" baseline="0" noProof="0">
+            <a:endParaRPr kumimoji="0" lang="zh-CN" altLang="en-US" sz="1800" b="0" i="0" u="none" strike="noStrike" kern="1200" cap="none" spc="0" normalizeH="0" baseline="0" noProof="0">
               <a:ln>
                 <a:noFill/>
               </a:ln>
@@ -7311,9 +6928,7 @@
       <p:sp>
         <p:nvSpPr>
           <p:cNvPr id="14350" name="Freeform 11"/>
-          <p:cNvSpPr>
-            <a:spLocks/>
-          </p:cNvSpPr>
+          <p:cNvSpPr/>
           <p:nvPr/>
         </p:nvSpPr>
         <p:spPr bwMode="auto">
@@ -7388,8 +7003,6 @@
                   <a:srgbClr val="000000"/>
                 </a:solidFill>
                 <a:round/>
-                <a:headEnd/>
-                <a:tailEnd/>
               </a14:hiddenLine>
             </a:ext>
           </a:extLst>
@@ -7398,7 +7011,7 @@
           <a:bodyPr/>
           <a:lstStyle/>
           <a:p>
-            <a:pPr marL="0" marR="0" lvl="0" indent="0" algn="l" defTabSz="914034" rtl="0" eaLnBrk="1" fontAlgn="base" latinLnBrk="0" hangingPunct="1">
+            <a:pPr marL="0" marR="0" lvl="0" indent="0" algn="l" defTabSz="913765" rtl="0" eaLnBrk="1" fontAlgn="base" latinLnBrk="0" hangingPunct="1">
               <a:lnSpc>
                 <a:spcPct val="100000"/>
               </a:lnSpc>
@@ -7412,10 +7025,9 @@
               <a:buSzTx/>
               <a:buFontTx/>
               <a:buNone/>
-              <a:tabLst/>
               <a:defRPr/>
             </a:pPr>
-            <a:endParaRPr kumimoji="0" lang="zh-CN" altLang="en-US" sz="1799" b="0" i="0" u="none" strike="noStrike" kern="1200" cap="none" spc="0" normalizeH="0" baseline="0" noProof="0">
+            <a:endParaRPr kumimoji="0" lang="zh-CN" altLang="en-US" sz="1800" b="0" i="0" u="none" strike="noStrike" kern="1200" cap="none" spc="0" normalizeH="0" baseline="0" noProof="0">
               <a:ln>
                 <a:noFill/>
               </a:ln>
@@ -7435,9 +7047,7 @@
       <p:sp>
         <p:nvSpPr>
           <p:cNvPr id="14351" name="Freeform 10"/>
-          <p:cNvSpPr>
-            <a:spLocks/>
-          </p:cNvSpPr>
+          <p:cNvSpPr/>
           <p:nvPr/>
         </p:nvSpPr>
         <p:spPr bwMode="auto">
@@ -7545,15 +7155,13 @@
               <a:srgbClr val="A8A9AD"/>
             </a:solidFill>
             <a:round/>
-            <a:headEnd/>
-            <a:tailEnd/>
           </a:ln>
         </p:spPr>
         <p:txBody>
           <a:bodyPr/>
           <a:lstStyle/>
           <a:p>
-            <a:pPr marL="0" marR="0" lvl="0" indent="0" algn="l" defTabSz="914034" rtl="0" eaLnBrk="1" fontAlgn="base" latinLnBrk="0" hangingPunct="1">
+            <a:pPr marL="0" marR="0" lvl="0" indent="0" algn="l" defTabSz="913765" rtl="0" eaLnBrk="1" fontAlgn="base" latinLnBrk="0" hangingPunct="1">
               <a:lnSpc>
                 <a:spcPct val="100000"/>
               </a:lnSpc>
@@ -7567,10 +7175,9 @@
               <a:buSzTx/>
               <a:buFontTx/>
               <a:buNone/>
-              <a:tabLst/>
               <a:defRPr/>
             </a:pPr>
-            <a:endParaRPr kumimoji="0" lang="zh-CN" altLang="en-US" sz="1799" b="0" i="0" u="none" strike="noStrike" kern="1200" cap="none" spc="0" normalizeH="0" baseline="0" noProof="0">
+            <a:endParaRPr kumimoji="0" lang="zh-CN" altLang="en-US" sz="1800" b="0" i="0" u="none" strike="noStrike" kern="1200" cap="none" spc="0" normalizeH="0" baseline="0" noProof="0">
               <a:ln>
                 <a:noFill/>
               </a:ln>
@@ -7724,7 +7331,7 @@
             </a:lvl9pPr>
           </a:lstStyle>
           <a:p>
-            <a:pPr marL="0" marR="0" lvl="0" indent="0" algn="l" defTabSz="914034" rtl="0" eaLnBrk="1" fontAlgn="base" latinLnBrk="0" hangingPunct="1">
+            <a:pPr marL="0" marR="0" lvl="0" indent="0" algn="l" defTabSz="913765" rtl="0" eaLnBrk="1" fontAlgn="base" latinLnBrk="0" hangingPunct="1">
               <a:lnSpc>
                 <a:spcPct val="100000"/>
               </a:lnSpc>
@@ -7738,10 +7345,9 @@
               <a:buSzTx/>
               <a:buFontTx/>
               <a:buNone/>
-              <a:tabLst/>
               <a:defRPr/>
             </a:pPr>
-            <a:endParaRPr kumimoji="0" lang="zh-CN" altLang="en-US" sz="1799" b="0" i="0" u="none" strike="noStrike" kern="1200" cap="none" spc="0" normalizeH="0" baseline="0" noProof="0">
+            <a:endParaRPr kumimoji="0" lang="zh-CN" altLang="en-US" sz="1800" b="0" i="0" u="none" strike="noStrike" kern="1200" cap="none" spc="0" normalizeH="0" baseline="0" noProof="0">
               <a:ln>
                 <a:noFill/>
               </a:ln>
@@ -7914,7 +7520,7 @@
             </a:lvl9pPr>
           </a:lstStyle>
           <a:p>
-            <a:pPr marL="0" marR="0" lvl="0" indent="0" algn="l" defTabSz="914034" rtl="0" eaLnBrk="1" fontAlgn="base" latinLnBrk="0" hangingPunct="1">
+            <a:pPr marL="0" marR="0" lvl="0" indent="0" algn="l" defTabSz="913765" rtl="0" eaLnBrk="1" fontAlgn="base" latinLnBrk="0" hangingPunct="1">
               <a:lnSpc>
                 <a:spcPct val="100000"/>
               </a:lnSpc>
@@ -7928,11 +7534,10 @@
               <a:buSzTx/>
               <a:buFontTx/>
               <a:buNone/>
-              <a:tabLst/>
               <a:defRPr/>
             </a:pPr>
             <a:r>
-              <a:rPr kumimoji="0" lang="zh-CN" altLang="en-US" sz="2999" b="1" i="0" u="none" strike="noStrike" kern="1200" cap="none" spc="0" normalizeH="0" baseline="0" noProof="0" dirty="0">
+              <a:rPr kumimoji="0" lang="zh-CN" altLang="en-US" sz="3000" b="1" i="0" u="none" strike="noStrike" kern="1200" cap="none" spc="0" normalizeH="0" baseline="0" noProof="0" dirty="0">
                 <a:ln>
                   <a:noFill/>
                 </a:ln>
@@ -7942,12 +7547,26 @@
                 <a:effectLst/>
                 <a:uLnTx/>
                 <a:uFillTx/>
-                <a:latin typeface="微软雅黑" panose="020B0503020204020204" pitchFamily="34" charset="-122"/>
-                <a:ea typeface="微软雅黑" panose="020B0503020204020204" pitchFamily="34" charset="-122"/>
+                <a:latin typeface="微软雅黑" panose="020B0503020204020204" charset="-122"/>
+                <a:ea typeface="微软雅黑" panose="020B0503020204020204" charset="-122"/>
                 <a:cs typeface="+mn-cs"/>
               </a:rPr>
               <a:t>标题</a:t>
             </a:r>
+            <a:endParaRPr kumimoji="0" lang="zh-CN" altLang="en-US" sz="3000" b="1" i="0" u="none" strike="noStrike" kern="1200" cap="none" spc="0" normalizeH="0" baseline="0" noProof="0" dirty="0">
+              <a:ln>
+                <a:noFill/>
+              </a:ln>
+              <a:solidFill>
+                <a:srgbClr val="3C3C3C"/>
+              </a:solidFill>
+              <a:effectLst/>
+              <a:uLnTx/>
+              <a:uFillTx/>
+              <a:latin typeface="微软雅黑" panose="020B0503020204020204" charset="-122"/>
+              <a:ea typeface="微软雅黑" panose="020B0503020204020204" charset="-122"/>
+              <a:cs typeface="+mn-cs"/>
+            </a:endParaRPr>
           </a:p>
         </p:txBody>
       </p:sp>
@@ -8107,7 +7726,7 @@
             </a:lvl9pPr>
           </a:lstStyle>
           <a:p>
-            <a:pPr marL="0" marR="0" lvl="0" indent="0" algn="l" defTabSz="914034" rtl="0" eaLnBrk="1" fontAlgn="base" latinLnBrk="0" hangingPunct="1">
+            <a:pPr marL="0" marR="0" lvl="0" indent="0" algn="l" defTabSz="913765" rtl="0" eaLnBrk="1" fontAlgn="base" latinLnBrk="0" hangingPunct="1">
               <a:lnSpc>
                 <a:spcPct val="100000"/>
               </a:lnSpc>
@@ -8121,11 +7740,10 @@
               <a:buSzTx/>
               <a:buFontTx/>
               <a:buNone/>
-              <a:tabLst/>
               <a:defRPr/>
             </a:pPr>
             <a:r>
-              <a:rPr kumimoji="0" lang="en-US" altLang="zh-CN" sz="3998" b="1" i="0" u="none" strike="noStrike" kern="1200" cap="none" spc="0" normalizeH="0" baseline="0" noProof="0" dirty="0">
+              <a:rPr kumimoji="0" lang="en-US" altLang="zh-CN" sz="4000" b="1" i="0" u="none" strike="noStrike" kern="1200" cap="none" spc="0" normalizeH="0" baseline="0" noProof="0" dirty="0">
                 <a:ln>
                   <a:noFill/>
                 </a:ln>
@@ -8135,13 +7753,13 @@
                 <a:effectLst/>
                 <a:uLnTx/>
                 <a:uFillTx/>
-                <a:latin typeface="微软雅黑" panose="020B0503020204020204" pitchFamily="34" charset="-122"/>
-                <a:ea typeface="微软雅黑" panose="020B0503020204020204" pitchFamily="34" charset="-122"/>
+                <a:latin typeface="微软雅黑" panose="020B0503020204020204" charset="-122"/>
+                <a:ea typeface="微软雅黑" panose="020B0503020204020204" charset="-122"/>
                 <a:cs typeface="+mn-cs"/>
               </a:rPr>
               <a:t>1</a:t>
             </a:r>
-            <a:endParaRPr kumimoji="0" lang="zh-CN" altLang="en-US" sz="3998" b="1" i="0" u="none" strike="noStrike" kern="1200" cap="none" spc="0" normalizeH="0" baseline="0" noProof="0" dirty="0">
+            <a:endParaRPr kumimoji="0" lang="zh-CN" altLang="en-US" sz="4000" b="1" i="0" u="none" strike="noStrike" kern="1200" cap="none" spc="0" normalizeH="0" baseline="0" noProof="0" dirty="0">
               <a:ln>
                 <a:noFill/>
               </a:ln>
@@ -8151,8 +7769,8 @@
               <a:effectLst/>
               <a:uLnTx/>
               <a:uFillTx/>
-              <a:latin typeface="微软雅黑" panose="020B0503020204020204" pitchFamily="34" charset="-122"/>
-              <a:ea typeface="微软雅黑" panose="020B0503020204020204" pitchFamily="34" charset="-122"/>
+              <a:latin typeface="微软雅黑" panose="020B0503020204020204" charset="-122"/>
+              <a:ea typeface="微软雅黑" panose="020B0503020204020204" charset="-122"/>
               <a:cs typeface="+mn-cs"/>
             </a:endParaRPr>
           </a:p>
@@ -8314,7 +7932,7 @@
             </a:lvl9pPr>
           </a:lstStyle>
           <a:p>
-            <a:pPr marL="0" marR="0" lvl="0" indent="0" algn="l" defTabSz="914034" rtl="0" eaLnBrk="1" fontAlgn="base" latinLnBrk="0" hangingPunct="1">
+            <a:pPr marL="0" marR="0" lvl="0" indent="0" algn="l" defTabSz="913765" rtl="0" eaLnBrk="1" fontAlgn="base" latinLnBrk="0" hangingPunct="1">
               <a:lnSpc>
                 <a:spcPct val="100000"/>
               </a:lnSpc>
@@ -8328,11 +7946,10 @@
               <a:buSzTx/>
               <a:buFontTx/>
               <a:buNone/>
-              <a:tabLst/>
               <a:defRPr/>
             </a:pPr>
             <a:r>
-              <a:rPr kumimoji="0" lang="zh-CN" altLang="en-US" sz="2999" b="1" i="0" u="none" strike="noStrike" kern="1200" cap="none" spc="0" normalizeH="0" baseline="0" noProof="0" dirty="0">
+              <a:rPr kumimoji="0" lang="zh-CN" altLang="en-US" sz="3000" b="1" i="0" u="none" strike="noStrike" kern="1200" cap="none" spc="0" normalizeH="0" baseline="0" noProof="0" dirty="0">
                 <a:ln>
                   <a:noFill/>
                 </a:ln>
@@ -8342,12 +7959,26 @@
                 <a:effectLst/>
                 <a:uLnTx/>
                 <a:uFillTx/>
-                <a:latin typeface="微软雅黑" panose="020B0503020204020204" pitchFamily="34" charset="-122"/>
-                <a:ea typeface="微软雅黑" panose="020B0503020204020204" pitchFamily="34" charset="-122"/>
+                <a:latin typeface="微软雅黑" panose="020B0503020204020204" charset="-122"/>
+                <a:ea typeface="微软雅黑" panose="020B0503020204020204" charset="-122"/>
                 <a:cs typeface="+mn-cs"/>
               </a:rPr>
               <a:t>标题</a:t>
             </a:r>
+            <a:endParaRPr kumimoji="0" lang="zh-CN" altLang="en-US" sz="3000" b="1" i="0" u="none" strike="noStrike" kern="1200" cap="none" spc="0" normalizeH="0" baseline="0" noProof="0" dirty="0">
+              <a:ln>
+                <a:noFill/>
+              </a:ln>
+              <a:solidFill>
+                <a:srgbClr val="3C3C3C"/>
+              </a:solidFill>
+              <a:effectLst/>
+              <a:uLnTx/>
+              <a:uFillTx/>
+              <a:latin typeface="微软雅黑" panose="020B0503020204020204" charset="-122"/>
+              <a:ea typeface="微软雅黑" panose="020B0503020204020204" charset="-122"/>
+              <a:cs typeface="+mn-cs"/>
+            </a:endParaRPr>
           </a:p>
         </p:txBody>
       </p:sp>
@@ -8490,7 +8121,7 @@
             </a:lvl9pPr>
           </a:lstStyle>
           <a:p>
-            <a:pPr marL="0" marR="0" lvl="0" indent="0" algn="l" defTabSz="914034" rtl="0" eaLnBrk="1" fontAlgn="base" latinLnBrk="0" hangingPunct="1">
+            <a:pPr marL="0" marR="0" lvl="0" indent="0" algn="l" defTabSz="913765" rtl="0" eaLnBrk="1" fontAlgn="base" latinLnBrk="0" hangingPunct="1">
               <a:lnSpc>
                 <a:spcPct val="100000"/>
               </a:lnSpc>
@@ -8504,11 +8135,10 @@
               <a:buSzTx/>
               <a:buFontTx/>
               <a:buNone/>
-              <a:tabLst/>
               <a:defRPr/>
             </a:pPr>
             <a:r>
-              <a:rPr kumimoji="0" lang="en-US" altLang="zh-CN" sz="3998" b="1" i="0" u="none" strike="noStrike" kern="1200" cap="none" spc="0" normalizeH="0" baseline="0" noProof="0" dirty="0">
+              <a:rPr kumimoji="0" lang="en-US" altLang="zh-CN" sz="4000" b="1" i="0" u="none" strike="noStrike" kern="1200" cap="none" spc="0" normalizeH="0" baseline="0" noProof="0" dirty="0">
                 <a:ln>
                   <a:noFill/>
                 </a:ln>
@@ -8518,13 +8148,13 @@
                 <a:effectLst/>
                 <a:uLnTx/>
                 <a:uFillTx/>
-                <a:latin typeface="微软雅黑" panose="020B0503020204020204" pitchFamily="34" charset="-122"/>
-                <a:ea typeface="微软雅黑" panose="020B0503020204020204" pitchFamily="34" charset="-122"/>
+                <a:latin typeface="微软雅黑" panose="020B0503020204020204" charset="-122"/>
+                <a:ea typeface="微软雅黑" panose="020B0503020204020204" charset="-122"/>
                 <a:cs typeface="+mn-cs"/>
               </a:rPr>
               <a:t>2</a:t>
             </a:r>
-            <a:endParaRPr kumimoji="0" lang="zh-CN" altLang="en-US" sz="3998" b="1" i="0" u="none" strike="noStrike" kern="1200" cap="none" spc="0" normalizeH="0" baseline="0" noProof="0" dirty="0">
+            <a:endParaRPr kumimoji="0" lang="zh-CN" altLang="en-US" sz="4000" b="1" i="0" u="none" strike="noStrike" kern="1200" cap="none" spc="0" normalizeH="0" baseline="0" noProof="0" dirty="0">
               <a:ln>
                 <a:noFill/>
               </a:ln>
@@ -8534,8 +8164,8 @@
               <a:effectLst/>
               <a:uLnTx/>
               <a:uFillTx/>
-              <a:latin typeface="微软雅黑" panose="020B0503020204020204" pitchFamily="34" charset="-122"/>
-              <a:ea typeface="微软雅黑" panose="020B0503020204020204" pitchFamily="34" charset="-122"/>
+              <a:latin typeface="微软雅黑" panose="020B0503020204020204" charset="-122"/>
+              <a:ea typeface="微软雅黑" panose="020B0503020204020204" charset="-122"/>
               <a:cs typeface="+mn-cs"/>
             </a:endParaRPr>
           </a:p>
@@ -8697,7 +8327,7 @@
             </a:lvl9pPr>
           </a:lstStyle>
           <a:p>
-            <a:pPr marL="0" marR="0" lvl="0" indent="0" algn="l" defTabSz="914034" rtl="0" eaLnBrk="1" fontAlgn="base" latinLnBrk="0" hangingPunct="1">
+            <a:pPr marL="0" marR="0" lvl="0" indent="0" algn="l" defTabSz="913765" rtl="0" eaLnBrk="1" fontAlgn="base" latinLnBrk="0" hangingPunct="1">
               <a:lnSpc>
                 <a:spcPct val="100000"/>
               </a:lnSpc>
@@ -8711,11 +8341,10 @@
               <a:buSzTx/>
               <a:buFontTx/>
               <a:buNone/>
-              <a:tabLst/>
               <a:defRPr/>
             </a:pPr>
             <a:r>
-              <a:rPr kumimoji="0" lang="zh-CN" altLang="en-US" sz="2999" b="1" i="0" u="none" strike="noStrike" kern="1200" cap="none" spc="0" normalizeH="0" baseline="0" noProof="0" dirty="0">
+              <a:rPr kumimoji="0" lang="zh-CN" altLang="en-US" sz="3000" b="1" i="0" u="none" strike="noStrike" kern="1200" cap="none" spc="0" normalizeH="0" baseline="0" noProof="0" dirty="0">
                 <a:ln>
                   <a:noFill/>
                 </a:ln>
@@ -8725,12 +8354,26 @@
                 <a:effectLst/>
                 <a:uLnTx/>
                 <a:uFillTx/>
-                <a:latin typeface="微软雅黑" panose="020B0503020204020204" pitchFamily="34" charset="-122"/>
-                <a:ea typeface="微软雅黑" panose="020B0503020204020204" pitchFamily="34" charset="-122"/>
+                <a:latin typeface="微软雅黑" panose="020B0503020204020204" charset="-122"/>
+                <a:ea typeface="微软雅黑" panose="020B0503020204020204" charset="-122"/>
                 <a:cs typeface="+mn-cs"/>
               </a:rPr>
               <a:t>标题</a:t>
             </a:r>
+            <a:endParaRPr kumimoji="0" lang="zh-CN" altLang="en-US" sz="3000" b="1" i="0" u="none" strike="noStrike" kern="1200" cap="none" spc="0" normalizeH="0" baseline="0" noProof="0" dirty="0">
+              <a:ln>
+                <a:noFill/>
+              </a:ln>
+              <a:solidFill>
+                <a:srgbClr val="3C3C3C"/>
+              </a:solidFill>
+              <a:effectLst/>
+              <a:uLnTx/>
+              <a:uFillTx/>
+              <a:latin typeface="微软雅黑" panose="020B0503020204020204" charset="-122"/>
+              <a:ea typeface="微软雅黑" panose="020B0503020204020204" charset="-122"/>
+              <a:cs typeface="+mn-cs"/>
+            </a:endParaRPr>
           </a:p>
         </p:txBody>
       </p:sp>
@@ -8890,7 +8533,7 @@
             </a:lvl9pPr>
           </a:lstStyle>
           <a:p>
-            <a:pPr marL="0" marR="0" lvl="0" indent="0" algn="l" defTabSz="914034" rtl="0" eaLnBrk="1" fontAlgn="base" latinLnBrk="0" hangingPunct="1">
+            <a:pPr marL="0" marR="0" lvl="0" indent="0" algn="l" defTabSz="913765" rtl="0" eaLnBrk="1" fontAlgn="base" latinLnBrk="0" hangingPunct="1">
               <a:lnSpc>
                 <a:spcPct val="100000"/>
               </a:lnSpc>
@@ -8904,11 +8547,10 @@
               <a:buSzTx/>
               <a:buFontTx/>
               <a:buNone/>
-              <a:tabLst/>
               <a:defRPr/>
             </a:pPr>
             <a:r>
-              <a:rPr kumimoji="0" lang="en-US" altLang="zh-CN" sz="3998" b="1" i="0" u="none" strike="noStrike" kern="1200" cap="none" spc="0" normalizeH="0" baseline="0" noProof="0" dirty="0">
+              <a:rPr kumimoji="0" lang="en-US" altLang="zh-CN" sz="4000" b="1" i="0" u="none" strike="noStrike" kern="1200" cap="none" spc="0" normalizeH="0" baseline="0" noProof="0" dirty="0">
                 <a:ln>
                   <a:noFill/>
                 </a:ln>
@@ -8918,13 +8560,13 @@
                 <a:effectLst/>
                 <a:uLnTx/>
                 <a:uFillTx/>
-                <a:latin typeface="微软雅黑" panose="020B0503020204020204" pitchFamily="34" charset="-122"/>
-                <a:ea typeface="微软雅黑" panose="020B0503020204020204" pitchFamily="34" charset="-122"/>
+                <a:latin typeface="微软雅黑" panose="020B0503020204020204" charset="-122"/>
+                <a:ea typeface="微软雅黑" panose="020B0503020204020204" charset="-122"/>
                 <a:cs typeface="+mn-cs"/>
               </a:rPr>
               <a:t>3</a:t>
             </a:r>
-            <a:endParaRPr kumimoji="0" lang="zh-CN" altLang="en-US" sz="3998" b="1" i="0" u="none" strike="noStrike" kern="1200" cap="none" spc="0" normalizeH="0" baseline="0" noProof="0" dirty="0">
+            <a:endParaRPr kumimoji="0" lang="zh-CN" altLang="en-US" sz="4000" b="1" i="0" u="none" strike="noStrike" kern="1200" cap="none" spc="0" normalizeH="0" baseline="0" noProof="0" dirty="0">
               <a:ln>
                 <a:noFill/>
               </a:ln>
@@ -8934,8 +8576,8 @@
               <a:effectLst/>
               <a:uLnTx/>
               <a:uFillTx/>
-              <a:latin typeface="微软雅黑" panose="020B0503020204020204" pitchFamily="34" charset="-122"/>
-              <a:ea typeface="微软雅黑" panose="020B0503020204020204" pitchFamily="34" charset="-122"/>
+              <a:latin typeface="微软雅黑" panose="020B0503020204020204" charset="-122"/>
+              <a:ea typeface="微软雅黑" panose="020B0503020204020204" charset="-122"/>
               <a:cs typeface="+mn-cs"/>
             </a:endParaRPr>
           </a:p>
@@ -9097,7 +8739,7 @@
             </a:lvl9pPr>
           </a:lstStyle>
           <a:p>
-            <a:pPr marL="0" marR="0" lvl="0" indent="0" algn="l" defTabSz="914034" rtl="0" eaLnBrk="1" fontAlgn="base" latinLnBrk="0" hangingPunct="1">
+            <a:pPr marL="0" marR="0" lvl="0" indent="0" algn="l" defTabSz="913765" rtl="0" eaLnBrk="1" fontAlgn="base" latinLnBrk="0" hangingPunct="1">
               <a:lnSpc>
                 <a:spcPct val="100000"/>
               </a:lnSpc>
@@ -9111,11 +8753,10 @@
               <a:buSzTx/>
               <a:buFontTx/>
               <a:buNone/>
-              <a:tabLst/>
               <a:defRPr/>
             </a:pPr>
             <a:r>
-              <a:rPr kumimoji="0" lang="zh-CN" altLang="en-US" sz="2999" b="1" i="0" u="none" strike="noStrike" kern="1200" cap="none" spc="0" normalizeH="0" baseline="0" noProof="0" dirty="0">
+              <a:rPr kumimoji="0" lang="zh-CN" altLang="en-US" sz="3000" b="1" i="0" u="none" strike="noStrike" kern="1200" cap="none" spc="0" normalizeH="0" baseline="0" noProof="0" dirty="0">
                 <a:ln>
                   <a:noFill/>
                 </a:ln>
@@ -9125,12 +8766,26 @@
                 <a:effectLst/>
                 <a:uLnTx/>
                 <a:uFillTx/>
-                <a:latin typeface="微软雅黑" panose="020B0503020204020204" pitchFamily="34" charset="-122"/>
-                <a:ea typeface="微软雅黑" panose="020B0503020204020204" pitchFamily="34" charset="-122"/>
+                <a:latin typeface="微软雅黑" panose="020B0503020204020204" charset="-122"/>
+                <a:ea typeface="微软雅黑" panose="020B0503020204020204" charset="-122"/>
                 <a:cs typeface="+mn-cs"/>
               </a:rPr>
               <a:t>标题</a:t>
             </a:r>
+            <a:endParaRPr kumimoji="0" lang="zh-CN" altLang="en-US" sz="3000" b="1" i="0" u="none" strike="noStrike" kern="1200" cap="none" spc="0" normalizeH="0" baseline="0" noProof="0" dirty="0">
+              <a:ln>
+                <a:noFill/>
+              </a:ln>
+              <a:solidFill>
+                <a:srgbClr val="3C3C3C"/>
+              </a:solidFill>
+              <a:effectLst/>
+              <a:uLnTx/>
+              <a:uFillTx/>
+              <a:latin typeface="微软雅黑" panose="020B0503020204020204" charset="-122"/>
+              <a:ea typeface="微软雅黑" panose="020B0503020204020204" charset="-122"/>
+              <a:cs typeface="+mn-cs"/>
+            </a:endParaRPr>
           </a:p>
         </p:txBody>
       </p:sp>
@@ -9290,7 +8945,7 @@
             </a:lvl9pPr>
           </a:lstStyle>
           <a:p>
-            <a:pPr marL="0" marR="0" lvl="0" indent="0" algn="l" defTabSz="914034" rtl="0" eaLnBrk="1" fontAlgn="base" latinLnBrk="0" hangingPunct="1">
+            <a:pPr marL="0" marR="0" lvl="0" indent="0" algn="l" defTabSz="913765" rtl="0" eaLnBrk="1" fontAlgn="base" latinLnBrk="0" hangingPunct="1">
               <a:lnSpc>
                 <a:spcPct val="100000"/>
               </a:lnSpc>
@@ -9304,11 +8959,10 @@
               <a:buSzTx/>
               <a:buFontTx/>
               <a:buNone/>
-              <a:tabLst/>
               <a:defRPr/>
             </a:pPr>
             <a:r>
-              <a:rPr kumimoji="0" lang="en-US" altLang="zh-CN" sz="3998" b="1" i="0" u="none" strike="noStrike" kern="1200" cap="none" spc="0" normalizeH="0" baseline="0" noProof="0" dirty="0">
+              <a:rPr kumimoji="0" lang="en-US" altLang="zh-CN" sz="4000" b="1" i="0" u="none" strike="noStrike" kern="1200" cap="none" spc="0" normalizeH="0" baseline="0" noProof="0" dirty="0">
                 <a:ln>
                   <a:noFill/>
                 </a:ln>
@@ -9318,13 +8972,13 @@
                 <a:effectLst/>
                 <a:uLnTx/>
                 <a:uFillTx/>
-                <a:latin typeface="微软雅黑" panose="020B0503020204020204" pitchFamily="34" charset="-122"/>
-                <a:ea typeface="微软雅黑" panose="020B0503020204020204" pitchFamily="34" charset="-122"/>
+                <a:latin typeface="微软雅黑" panose="020B0503020204020204" charset="-122"/>
+                <a:ea typeface="微软雅黑" panose="020B0503020204020204" charset="-122"/>
                 <a:cs typeface="+mn-cs"/>
               </a:rPr>
               <a:t>4</a:t>
             </a:r>
-            <a:endParaRPr kumimoji="0" lang="zh-CN" altLang="en-US" sz="3998" b="1" i="0" u="none" strike="noStrike" kern="1200" cap="none" spc="0" normalizeH="0" baseline="0" noProof="0" dirty="0">
+            <a:endParaRPr kumimoji="0" lang="zh-CN" altLang="en-US" sz="4000" b="1" i="0" u="none" strike="noStrike" kern="1200" cap="none" spc="0" normalizeH="0" baseline="0" noProof="0" dirty="0">
               <a:ln>
                 <a:noFill/>
               </a:ln>
@@ -9334,8 +8988,8 @@
               <a:effectLst/>
               <a:uLnTx/>
               <a:uFillTx/>
-              <a:latin typeface="微软雅黑" panose="020B0503020204020204" pitchFamily="34" charset="-122"/>
-              <a:ea typeface="微软雅黑" panose="020B0503020204020204" pitchFamily="34" charset="-122"/>
+              <a:latin typeface="微软雅黑" panose="020B0503020204020204" charset="-122"/>
+              <a:ea typeface="微软雅黑" panose="020B0503020204020204" charset="-122"/>
               <a:cs typeface="+mn-cs"/>
             </a:endParaRPr>
           </a:p>
@@ -9497,7 +9151,7 @@
             </a:lvl9pPr>
           </a:lstStyle>
           <a:p>
-            <a:pPr marL="0" marR="0" lvl="0" indent="0" algn="l" defTabSz="914034" rtl="0" eaLnBrk="1" fontAlgn="base" latinLnBrk="0" hangingPunct="1">
+            <a:pPr marL="0" marR="0" lvl="0" indent="0" algn="l" defTabSz="913765" rtl="0" eaLnBrk="1" fontAlgn="base" latinLnBrk="0" hangingPunct="1">
               <a:lnSpc>
                 <a:spcPct val="100000"/>
               </a:lnSpc>
@@ -9511,11 +9165,10 @@
               <a:buSzTx/>
               <a:buFontTx/>
               <a:buNone/>
-              <a:tabLst/>
               <a:defRPr/>
             </a:pPr>
             <a:r>
-              <a:rPr kumimoji="0" lang="zh-CN" altLang="en-US" sz="2999" b="1" i="0" u="none" strike="noStrike" kern="1200" cap="none" spc="0" normalizeH="0" baseline="0" noProof="0" dirty="0">
+              <a:rPr kumimoji="0" lang="zh-CN" altLang="en-US" sz="3000" b="1" i="0" u="none" strike="noStrike" kern="1200" cap="none" spc="0" normalizeH="0" baseline="0" noProof="0" dirty="0">
                 <a:ln>
                   <a:noFill/>
                 </a:ln>
@@ -9525,12 +9178,26 @@
                 <a:effectLst/>
                 <a:uLnTx/>
                 <a:uFillTx/>
-                <a:latin typeface="微软雅黑" panose="020B0503020204020204" pitchFamily="34" charset="-122"/>
-                <a:ea typeface="微软雅黑" panose="020B0503020204020204" pitchFamily="34" charset="-122"/>
+                <a:latin typeface="微软雅黑" panose="020B0503020204020204" charset="-122"/>
+                <a:ea typeface="微软雅黑" panose="020B0503020204020204" charset="-122"/>
                 <a:cs typeface="+mn-cs"/>
               </a:rPr>
               <a:t>标题</a:t>
             </a:r>
+            <a:endParaRPr kumimoji="0" lang="zh-CN" altLang="en-US" sz="3000" b="1" i="0" u="none" strike="noStrike" kern="1200" cap="none" spc="0" normalizeH="0" baseline="0" noProof="0" dirty="0">
+              <a:ln>
+                <a:noFill/>
+              </a:ln>
+              <a:solidFill>
+                <a:srgbClr val="3C3C3C"/>
+              </a:solidFill>
+              <a:effectLst/>
+              <a:uLnTx/>
+              <a:uFillTx/>
+              <a:latin typeface="微软雅黑" panose="020B0503020204020204" charset="-122"/>
+              <a:ea typeface="微软雅黑" panose="020B0503020204020204" charset="-122"/>
+              <a:cs typeface="+mn-cs"/>
+            </a:endParaRPr>
           </a:p>
         </p:txBody>
       </p:sp>
@@ -9690,7 +9357,7 @@
             </a:lvl9pPr>
           </a:lstStyle>
           <a:p>
-            <a:pPr marL="0" marR="0" lvl="0" indent="0" algn="l" defTabSz="914034" rtl="0" eaLnBrk="1" fontAlgn="base" latinLnBrk="0" hangingPunct="1">
+            <a:pPr marL="0" marR="0" lvl="0" indent="0" algn="l" defTabSz="913765" rtl="0" eaLnBrk="1" fontAlgn="base" latinLnBrk="0" hangingPunct="1">
               <a:lnSpc>
                 <a:spcPct val="100000"/>
               </a:lnSpc>
@@ -9704,11 +9371,10 @@
               <a:buSzTx/>
               <a:buFontTx/>
               <a:buNone/>
-              <a:tabLst/>
               <a:defRPr/>
             </a:pPr>
             <a:r>
-              <a:rPr kumimoji="0" lang="en-US" altLang="zh-CN" sz="3998" b="1" i="0" u="none" strike="noStrike" kern="1200" cap="none" spc="0" normalizeH="0" baseline="0" noProof="0">
+              <a:rPr kumimoji="0" lang="en-US" altLang="zh-CN" sz="4000" b="1" i="0" u="none" strike="noStrike" kern="1200" cap="none" spc="0" normalizeH="0" baseline="0" noProof="0">
                 <a:ln>
                   <a:noFill/>
                 </a:ln>
@@ -9718,13 +9384,13 @@
                 <a:effectLst/>
                 <a:uLnTx/>
                 <a:uFillTx/>
-                <a:latin typeface="微软雅黑" panose="020B0503020204020204" pitchFamily="34" charset="-122"/>
-                <a:ea typeface="微软雅黑" panose="020B0503020204020204" pitchFamily="34" charset="-122"/>
+                <a:latin typeface="微软雅黑" panose="020B0503020204020204" charset="-122"/>
+                <a:ea typeface="微软雅黑" panose="020B0503020204020204" charset="-122"/>
                 <a:cs typeface="+mn-cs"/>
               </a:rPr>
               <a:t>5</a:t>
             </a:r>
-            <a:endParaRPr kumimoji="0" lang="zh-CN" altLang="en-US" sz="3998" b="1" i="0" u="none" strike="noStrike" kern="1200" cap="none" spc="0" normalizeH="0" baseline="0" noProof="0">
+            <a:endParaRPr kumimoji="0" lang="zh-CN" altLang="en-US" sz="4000" b="1" i="0" u="none" strike="noStrike" kern="1200" cap="none" spc="0" normalizeH="0" baseline="0" noProof="0">
               <a:ln>
                 <a:noFill/>
               </a:ln>
@@ -9734,8 +9400,8 @@
               <a:effectLst/>
               <a:uLnTx/>
               <a:uFillTx/>
-              <a:latin typeface="微软雅黑" panose="020B0503020204020204" pitchFamily="34" charset="-122"/>
-              <a:ea typeface="微软雅黑" panose="020B0503020204020204" pitchFamily="34" charset="-122"/>
+              <a:latin typeface="微软雅黑" panose="020B0503020204020204" charset="-122"/>
+              <a:ea typeface="微软雅黑" panose="020B0503020204020204" charset="-122"/>
               <a:cs typeface="+mn-cs"/>
             </a:endParaRPr>
           </a:p>
@@ -9744,9 +9410,7 @@
       <p:sp>
         <p:nvSpPr>
           <p:cNvPr id="14363" name="Freeform 5"/>
-          <p:cNvSpPr>
-            <a:spLocks/>
-          </p:cNvSpPr>
+          <p:cNvSpPr/>
           <p:nvPr/>
         </p:nvSpPr>
         <p:spPr bwMode="auto">
@@ -9809,11 +9473,11 @@
             </a:pathLst>
           </a:custGeom>
           <a:blipFill dpi="0" rotWithShape="1">
-            <a:blip r:embed="rId3" cstate="screen">
+            <a:blip r:embed="rId1" cstate="screen">
               <a:extLst>
                 <a:ext uri="{BEBA8EAE-BF5A-486C-A8C5-ECC9F3942E4B}">
                   <a14:imgProps xmlns:a14="http://schemas.microsoft.com/office/drawing/2010/main">
-                    <a14:imgLayer r:embed="rId4">
+                    <a14:imgLayer r:embed="rId2">
                       <a14:imgEffect>
                         <a14:colorTemperature colorTemp="5900"/>
                       </a14:imgEffect>
@@ -9822,9 +9486,6 @@
                       </a14:imgEffect>
                     </a14:imgLayer>
                   </a14:imgProps>
-                </a:ext>
-                <a:ext uri="{28A0092B-C50C-407E-A947-70E740481C1C}">
-                  <a14:useLocalDpi xmlns:a14="http://schemas.microsoft.com/office/drawing/2010/main"/>
                 </a:ext>
               </a:extLst>
             </a:blip>
@@ -9841,7 +9502,7 @@
           <a:bodyPr/>
           <a:lstStyle/>
           <a:p>
-            <a:pPr marL="0" marR="0" lvl="0" indent="0" algn="l" defTabSz="914034" rtl="0" eaLnBrk="1" fontAlgn="base" latinLnBrk="0" hangingPunct="1">
+            <a:pPr marL="0" marR="0" lvl="0" indent="0" algn="l" defTabSz="913765" rtl="0" eaLnBrk="1" fontAlgn="base" latinLnBrk="0" hangingPunct="1">
               <a:lnSpc>
                 <a:spcPct val="100000"/>
               </a:lnSpc>
@@ -9855,10 +9516,9 @@
               <a:buSzTx/>
               <a:buFontTx/>
               <a:buNone/>
-              <a:tabLst/>
               <a:defRPr/>
             </a:pPr>
-            <a:endParaRPr kumimoji="0" lang="zh-CN" altLang="en-US" sz="1799" b="0" i="0" u="none" strike="noStrike" kern="1200" cap="none" spc="0" normalizeH="0" baseline="0" noProof="0">
+            <a:endParaRPr kumimoji="0" lang="zh-CN" altLang="en-US" sz="1800" b="0" i="0" u="none" strike="noStrike" kern="1200" cap="none" spc="0" normalizeH="0" baseline="0" noProof="0">
               <a:ln>
                 <a:noFill/>
               </a:ln>
@@ -9892,9 +9552,7 @@
         <p:sp>
           <p:nvSpPr>
             <p:cNvPr id="14364" name="Freeform 6"/>
-            <p:cNvSpPr>
-              <a:spLocks/>
-            </p:cNvSpPr>
+            <p:cNvSpPr/>
             <p:nvPr/>
           </p:nvSpPr>
           <p:spPr bwMode="auto">
@@ -9967,7 +9625,7 @@
             <a:bodyPr/>
             <a:lstStyle/>
             <a:p>
-              <a:pPr marL="0" marR="0" lvl="0" indent="0" algn="l" defTabSz="914034" rtl="0" eaLnBrk="1" fontAlgn="base" latinLnBrk="0" hangingPunct="1">
+              <a:pPr marL="0" marR="0" lvl="0" indent="0" algn="l" defTabSz="913765" rtl="0" eaLnBrk="1" fontAlgn="base" latinLnBrk="0" hangingPunct="1">
                 <a:lnSpc>
                   <a:spcPct val="100000"/>
                 </a:lnSpc>
@@ -9981,10 +9639,9 @@
                 <a:buSzTx/>
                 <a:buFontTx/>
                 <a:buNone/>
-                <a:tabLst/>
                 <a:defRPr/>
               </a:pPr>
-              <a:endParaRPr kumimoji="0" lang="zh-CN" altLang="en-US" sz="1799" b="0" i="0" u="none" strike="noStrike" kern="1200" cap="none" spc="0" normalizeH="0" baseline="0" noProof="0">
+              <a:endParaRPr kumimoji="0" lang="zh-CN" altLang="en-US" sz="1800" b="0" i="0" u="none" strike="noStrike" kern="1200" cap="none" spc="0" normalizeH="0" baseline="0" noProof="0">
                 <a:ln>
                   <a:noFill/>
                 </a:ln>
@@ -10138,7 +9795,7 @@
               </a:lvl9pPr>
             </a:lstStyle>
             <a:p>
-              <a:pPr marL="0" marR="0" lvl="0" indent="0" algn="l" defTabSz="914034" rtl="0" eaLnBrk="1" fontAlgn="base" latinLnBrk="0" hangingPunct="1">
+              <a:pPr marL="0" marR="0" lvl="0" indent="0" algn="l" defTabSz="913765" rtl="0" eaLnBrk="1" fontAlgn="base" latinLnBrk="0" hangingPunct="1">
                 <a:lnSpc>
                   <a:spcPct val="100000"/>
                 </a:lnSpc>
@@ -10152,10 +9809,9 @@
                 <a:buSzTx/>
                 <a:buFontTx/>
                 <a:buNone/>
-                <a:tabLst/>
                 <a:defRPr/>
               </a:pPr>
-              <a:endParaRPr kumimoji="0" lang="zh-CN" altLang="en-US" sz="1799" b="0" i="0" u="none" strike="noStrike" kern="1200" cap="none" spc="0" normalizeH="0" baseline="0" noProof="0">
+              <a:endParaRPr kumimoji="0" lang="zh-CN" altLang="en-US" sz="1800" b="0" i="0" u="none" strike="noStrike" kern="1200" cap="none" spc="0" normalizeH="0" baseline="0" noProof="0">
                 <a:ln>
                   <a:noFill/>
                 </a:ln>
@@ -10329,7 +9985,7 @@
             </a:lvl9pPr>
           </a:lstStyle>
           <a:p>
-            <a:pPr marL="0" marR="0" lvl="0" indent="0" algn="l" defTabSz="914034" rtl="0" eaLnBrk="1" fontAlgn="base" latinLnBrk="0" hangingPunct="1">
+            <a:pPr marL="0" marR="0" lvl="0" indent="0" algn="l" defTabSz="913765" rtl="0" eaLnBrk="1" fontAlgn="base" latinLnBrk="0" hangingPunct="1">
               <a:lnSpc>
                 <a:spcPct val="100000"/>
               </a:lnSpc>
@@ -10343,11 +9999,10 @@
               <a:buSzTx/>
               <a:buFontTx/>
               <a:buNone/>
-              <a:tabLst/>
               <a:defRPr/>
             </a:pPr>
             <a:r>
-              <a:rPr kumimoji="0" lang="zh-CN" altLang="en-US" sz="2799" b="0" i="0" u="none" strike="noStrike" kern="1200" cap="none" spc="0" normalizeH="0" baseline="0" noProof="0" dirty="0">
+              <a:rPr kumimoji="0" lang="zh-CN" altLang="en-US" sz="2800" b="0" i="0" u="none" strike="noStrike" kern="1200" cap="none" spc="0" normalizeH="0" baseline="0" noProof="0" dirty="0">
                 <a:ln>
                   <a:noFill/>
                 </a:ln>
@@ -10357,12 +10012,26 @@
                 <a:effectLst/>
                 <a:uLnTx/>
                 <a:uFillTx/>
-                <a:latin typeface="微软雅黑" panose="020B0503020204020204" pitchFamily="34" charset="-122"/>
-                <a:ea typeface="微软雅黑" panose="020B0503020204020204" pitchFamily="34" charset="-122"/>
+                <a:latin typeface="微软雅黑" panose="020B0503020204020204" charset="-122"/>
+                <a:ea typeface="微软雅黑" panose="020B0503020204020204" charset="-122"/>
                 <a:cs typeface="+mn-cs"/>
               </a:rPr>
               <a:t>目录</a:t>
             </a:r>
+            <a:endParaRPr kumimoji="0" lang="zh-CN" altLang="en-US" sz="2800" b="0" i="0" u="none" strike="noStrike" kern="1200" cap="none" spc="0" normalizeH="0" baseline="0" noProof="0" dirty="0">
+              <a:ln>
+                <a:noFill/>
+              </a:ln>
+              <a:solidFill>
+                <a:srgbClr val="FFFFFF"/>
+              </a:solidFill>
+              <a:effectLst/>
+              <a:uLnTx/>
+              <a:uFillTx/>
+              <a:latin typeface="微软雅黑" panose="020B0503020204020204" charset="-122"/>
+              <a:ea typeface="微软雅黑" panose="020B0503020204020204" charset="-122"/>
+              <a:cs typeface="+mn-cs"/>
+            </a:endParaRPr>
           </a:p>
         </p:txBody>
       </p:sp>
@@ -10522,7 +10191,7 @@
             </a:lvl9pPr>
           </a:lstStyle>
           <a:p>
-            <a:pPr marL="0" marR="0" lvl="0" indent="0" algn="l" defTabSz="914034" rtl="0" eaLnBrk="1" fontAlgn="base" latinLnBrk="0" hangingPunct="1">
+            <a:pPr marL="0" marR="0" lvl="0" indent="0" algn="l" defTabSz="913765" rtl="0" eaLnBrk="1" fontAlgn="base" latinLnBrk="0" hangingPunct="1">
               <a:lnSpc>
                 <a:spcPct val="100000"/>
               </a:lnSpc>
@@ -10536,11 +10205,10 @@
               <a:buSzTx/>
               <a:buFontTx/>
               <a:buNone/>
-              <a:tabLst/>
               <a:defRPr/>
             </a:pPr>
             <a:r>
-              <a:rPr kumimoji="0" lang="en-US" altLang="zh-CN" sz="1799" b="0" i="0" u="none" strike="noStrike" kern="1200" cap="none" spc="0" normalizeH="0" baseline="0" noProof="0">
+              <a:rPr kumimoji="0" lang="en-US" altLang="zh-CN" sz="1800" b="0" i="0" u="none" strike="noStrike" kern="1200" cap="none" spc="0" normalizeH="0" baseline="0" noProof="0">
                 <a:ln>
                   <a:noFill/>
                 </a:ln>
@@ -10550,13 +10218,13 @@
                 <a:effectLst/>
                 <a:uLnTx/>
                 <a:uFillTx/>
-                <a:latin typeface="微软雅黑" panose="020B0503020204020204" pitchFamily="34" charset="-122"/>
-                <a:ea typeface="微软雅黑" panose="020B0503020204020204" pitchFamily="34" charset="-122"/>
+                <a:latin typeface="微软雅黑" panose="020B0503020204020204" charset="-122"/>
+                <a:ea typeface="微软雅黑" panose="020B0503020204020204" charset="-122"/>
                 <a:cs typeface="+mn-cs"/>
               </a:rPr>
               <a:t>Contents</a:t>
             </a:r>
-            <a:endParaRPr kumimoji="0" lang="zh-CN" altLang="en-US" sz="1799" b="0" i="0" u="none" strike="noStrike" kern="1200" cap="none" spc="0" normalizeH="0" baseline="0" noProof="0">
+            <a:endParaRPr kumimoji="0" lang="zh-CN" altLang="en-US" sz="1800" b="0" i="0" u="none" strike="noStrike" kern="1200" cap="none" spc="0" normalizeH="0" baseline="0" noProof="0">
               <a:ln>
                 <a:noFill/>
               </a:ln>
@@ -10566,8 +10234,8 @@
               <a:effectLst/>
               <a:uLnTx/>
               <a:uFillTx/>
-              <a:latin typeface="微软雅黑" panose="020B0503020204020204" pitchFamily="34" charset="-122"/>
-              <a:ea typeface="微软雅黑" panose="020B0503020204020204" pitchFamily="34" charset="-122"/>
+              <a:latin typeface="微软雅黑" panose="020B0503020204020204" charset="-122"/>
+              <a:ea typeface="微软雅黑" panose="020B0503020204020204" charset="-122"/>
               <a:cs typeface="+mn-cs"/>
             </a:endParaRPr>
           </a:p>
@@ -10582,13 +10250,7 @@
           <p:nvPr/>
         </p:nvPicPr>
         <p:blipFill>
-          <a:blip r:embed="rId5" cstate="screen">
-            <a:extLst>
-              <a:ext uri="{28A0092B-C50C-407E-A947-70E740481C1C}">
-                <a14:useLocalDpi xmlns:a14="http://schemas.microsoft.com/office/drawing/2010/main"/>
-              </a:ext>
-            </a:extLst>
-          </a:blip>
+          <a:blip r:embed="rId3" cstate="screen"/>
           <a:srcRect/>
           <a:stretch>
             <a:fillRect/>
@@ -10628,22 +10290,17 @@
         </p:spPr>
       </p:pic>
     </p:spTree>
-    <p:extLst>
-      <p:ext uri="{BB962C8B-B14F-4D97-AF65-F5344CB8AC3E}">
-        <p14:creationId xmlns:p14="http://schemas.microsoft.com/office/powerpoint/2010/main" val="3957891929"/>
-      </p:ext>
-    </p:extLst>
   </p:cSld>
   <p:clrMapOvr>
     <a:masterClrMapping/>
   </p:clrMapOvr>
-  <mc:AlternateContent xmlns:mc="http://schemas.openxmlformats.org/markup-compatibility/2006" xmlns:p14="http://schemas.microsoft.com/office/powerpoint/2010/main">
-    <mc:Choice Requires="p14">
+  <mc:AlternateContent xmlns:mc="http://schemas.openxmlformats.org/markup-compatibility/2006">
+    <mc:Choice xmlns:p14="http://schemas.microsoft.com/office/powerpoint/2010/main" Requires="p14">
       <p:transition p14:dur="100">
         <p:cut/>
       </p:transition>
     </mc:Choice>
-    <mc:Fallback xmlns="">
+    <mc:Fallback>
       <p:transition>
         <p:cut/>
       </p:transition>
@@ -10658,7 +10315,7 @@
               <p:cTn id="2" dur="indefinite" nodeType="mainSeq">
                 <p:childTnLst>
                   <p:par>
-                    <p:cTn id="3" fill="hold" nodeType="clickPar">
+                    <p:cTn id="3" fill="hold">
                       <p:stCondLst>
                         <p:cond delay="indefinite"/>
                         <p:cond evt="onBegin" delay="0">
@@ -10667,7 +10324,7 @@
                       </p:stCondLst>
                       <p:childTnLst>
                         <p:par>
-                          <p:cTn id="4" fill="hold" nodeType="withGroup">
+                          <p:cTn id="4" fill="hold">
                             <p:stCondLst>
                               <p:cond delay="0"/>
                             </p:stCondLst>
@@ -10711,7 +10368,7 @@
                           </p:cTn>
                         </p:par>
                         <p:par>
-                          <p:cTn id="8" fill="hold" nodeType="afterGroup">
+                          <p:cTn id="8" fill="hold">
                             <p:stCondLst>
                               <p:cond delay="500"/>
                             </p:stCondLst>
@@ -10790,7 +10447,7 @@
                           </p:cTn>
                         </p:par>
                         <p:par>
-                          <p:cTn id="15" fill="hold" nodeType="afterGroup">
+                          <p:cTn id="15" fill="hold">
                             <p:stCondLst>
                               <p:cond delay="1000"/>
                             </p:stCondLst>
@@ -11164,9 +10821,9 @@
                           </p:cTn>
                         </p:par>
                         <p:par>
-                          <p:cTn id="36" fill="hold" nodeType="afterGroup">
+                          <p:cTn id="36" fill="hold">
                             <p:stCondLst>
-                              <p:cond delay="1900"/>
+                              <p:cond delay="1500"/>
                             </p:stCondLst>
                             <p:childTnLst>
                               <p:par>
@@ -11208,9 +10865,9 @@
                           </p:cTn>
                         </p:par>
                         <p:par>
-                          <p:cTn id="40" fill="hold" nodeType="afterGroup">
+                          <p:cTn id="40" fill="hold">
                             <p:stCondLst>
-                              <p:cond delay="2200"/>
+                              <p:cond delay="2000"/>
                             </p:stCondLst>
                             <p:childTnLst>
                               <p:par>
@@ -11252,9 +10909,9 @@
                           </p:cTn>
                         </p:par>
                         <p:par>
-                          <p:cTn id="44" fill="hold" nodeType="afterGroup">
+                          <p:cTn id="44" fill="hold">
                             <p:stCondLst>
-                              <p:cond delay="2700"/>
+                              <p:cond delay="2500"/>
                             </p:stCondLst>
                             <p:childTnLst>
                               <p:par>
@@ -11290,7 +10947,7 @@
                         <p:par>
                           <p:cTn id="47" fill="hold">
                             <p:stCondLst>
-                              <p:cond delay="2700"/>
+                              <p:cond delay="2500"/>
                             </p:stCondLst>
                             <p:childTnLst>
                               <p:par>
@@ -11332,9 +10989,9 @@
                           </p:cTn>
                         </p:par>
                         <p:par>
-                          <p:cTn id="51" fill="hold" nodeType="afterGroup">
+                          <p:cTn id="51" fill="hold">
                             <p:stCondLst>
-                              <p:cond delay="3200"/>
+                              <p:cond delay="3000"/>
                             </p:stCondLst>
                             <p:childTnLst>
                               <p:par>
@@ -11376,7 +11033,7 @@
                           </p:cTn>
                         </p:par>
                         <p:par>
-                          <p:cTn id="55" fill="hold" nodeType="afterGroup">
+                          <p:cTn id="55" fill="hold">
                             <p:stCondLst>
                               <p:cond delay="3500"/>
                             </p:stCondLst>
@@ -11491,7 +11148,7 @@
                           </p:cTn>
                         </p:par>
                         <p:par>
-                          <p:cTn id="65" fill="hold" nodeType="afterGroup">
+                          <p:cTn id="65" fill="hold">
                             <p:stCondLst>
                               <p:cond delay="4500"/>
                             </p:stCondLst>
@@ -11535,9 +11192,9 @@
                           </p:cTn>
                         </p:par>
                         <p:par>
-                          <p:cTn id="69" fill="hold" nodeType="afterGroup">
+                          <p:cTn id="69" fill="hold">
                             <p:stCondLst>
-                              <p:cond delay="4800"/>
+                              <p:cond delay="5000"/>
                             </p:stCondLst>
                             <p:childTnLst>
                               <p:par>
@@ -11579,9 +11236,9 @@
                           </p:cTn>
                         </p:par>
                         <p:par>
-                          <p:cTn id="73" fill="hold" nodeType="afterGroup">
+                          <p:cTn id="73" fill="hold">
                             <p:stCondLst>
-                              <p:cond delay="5300"/>
+                              <p:cond delay="5500"/>
                             </p:stCondLst>
                             <p:childTnLst>
                               <p:par>
@@ -11615,9 +11272,9 @@
                           </p:cTn>
                         </p:par>
                         <p:par>
-                          <p:cTn id="76" fill="hold" nodeType="afterGroup">
+                          <p:cTn id="76" fill="hold">
                             <p:stCondLst>
-                              <p:cond delay="5300"/>
+                              <p:cond delay="5500"/>
                             </p:stCondLst>
                             <p:childTnLst>
                               <p:par>
@@ -11659,9 +11316,9 @@
                           </p:cTn>
                         </p:par>
                         <p:par>
-                          <p:cTn id="80" fill="hold" nodeType="afterGroup">
+                          <p:cTn id="80" fill="hold">
                             <p:stCondLst>
-                              <p:cond delay="5800"/>
+                              <p:cond delay="6000"/>
                             </p:stCondLst>
                             <p:childTnLst>
                               <p:par>
@@ -11703,9 +11360,9 @@
                           </p:cTn>
                         </p:par>
                         <p:par>
-                          <p:cTn id="84" fill="hold" nodeType="afterGroup">
+                          <p:cTn id="84" fill="hold">
                             <p:stCondLst>
-                              <p:cond delay="6100"/>
+                              <p:cond delay="6500"/>
                             </p:stCondLst>
                             <p:childTnLst>
                               <p:par>
@@ -11776,7 +11433,7 @@
                         <p:par>
                           <p:cTn id="90" fill="hold">
                             <p:stCondLst>
-                              <p:cond delay="6600"/>
+                              <p:cond delay="7000"/>
                             </p:stCondLst>
                             <p:childTnLst>
                               <p:par>
@@ -11818,9 +11475,9 @@
                           </p:cTn>
                         </p:par>
                         <p:par>
-                          <p:cTn id="94" fill="hold" nodeType="afterGroup">
+                          <p:cTn id="94" fill="hold">
                             <p:stCondLst>
-                              <p:cond delay="7100"/>
+                              <p:cond delay="7500"/>
                             </p:stCondLst>
                             <p:childTnLst>
                               <p:par>
@@ -11862,9 +11519,9 @@
                           </p:cTn>
                         </p:par>
                         <p:par>
-                          <p:cTn id="98" fill="hold" nodeType="afterGroup">
+                          <p:cTn id="98" fill="hold">
                             <p:stCondLst>
-                              <p:cond delay="7400"/>
+                              <p:cond delay="8000"/>
                             </p:stCondLst>
                             <p:childTnLst>
                               <p:par>
@@ -11906,9 +11563,9 @@
                           </p:cTn>
                         </p:par>
                         <p:par>
-                          <p:cTn id="102" fill="hold" nodeType="afterGroup">
+                          <p:cTn id="102" fill="hold">
                             <p:stCondLst>
-                              <p:cond delay="7900"/>
+                              <p:cond delay="8500"/>
                             </p:stCondLst>
                             <p:childTnLst>
                               <p:par>
@@ -11942,9 +11599,9 @@
                           </p:cTn>
                         </p:par>
                         <p:par>
-                          <p:cTn id="105" fill="hold" nodeType="afterGroup">
+                          <p:cTn id="105" fill="hold">
                             <p:stCondLst>
-                              <p:cond delay="7900"/>
+                              <p:cond delay="8500"/>
                             </p:stCondLst>
                             <p:childTnLst>
                               <p:par>
@@ -12038,14 +11695,9 @@
     <p:bg bwMode="auto">
       <p:bgPr>
         <a:blipFill dpi="0" rotWithShape="0">
-          <a:blip r:embed="rId3" cstate="screen">
+          <a:blip r:embed="rId1" cstate="screen">
             <a:alphaModFix amt="50000"/>
             <a:lum/>
-            <a:extLst>
-              <a:ext uri="{28A0092B-C50C-407E-A947-70E740481C1C}">
-                <a14:useLocalDpi xmlns:a14="http://schemas.microsoft.com/office/drawing/2010/main"/>
-              </a:ext>
-            </a:extLst>
           </a:blip>
           <a:srcRect/>
           <a:stretch>
@@ -12072,9 +11724,7 @@
       <p:sp>
         <p:nvSpPr>
           <p:cNvPr id="10242" name="Freeform 5"/>
-          <p:cNvSpPr>
-            <a:spLocks/>
-          </p:cNvSpPr>
+          <p:cNvSpPr/>
           <p:nvPr/>
         </p:nvSpPr>
         <p:spPr bwMode="auto">
@@ -12150,7 +11800,7 @@
           <a:bodyPr/>
           <a:lstStyle/>
           <a:p>
-            <a:pPr marL="0" marR="0" lvl="0" indent="0" algn="l" defTabSz="914034" rtl="0" eaLnBrk="1" fontAlgn="base" latinLnBrk="0" hangingPunct="1">
+            <a:pPr marL="0" marR="0" lvl="0" indent="0" algn="l" defTabSz="913765" rtl="0" eaLnBrk="1" fontAlgn="base" latinLnBrk="0" hangingPunct="1">
               <a:lnSpc>
                 <a:spcPct val="100000"/>
               </a:lnSpc>
@@ -12164,10 +11814,9 @@
               <a:buSzTx/>
               <a:buFontTx/>
               <a:buNone/>
-              <a:tabLst/>
               <a:defRPr/>
             </a:pPr>
-            <a:endParaRPr kumimoji="0" lang="zh-CN" altLang="en-US" sz="1799" b="0" i="0" u="none" strike="noStrike" kern="1200" cap="none" spc="0" normalizeH="0" baseline="0" noProof="0">
+            <a:endParaRPr kumimoji="0" lang="zh-CN" altLang="en-US" sz="1800" b="0" i="0" u="none" strike="noStrike" kern="1200" cap="none" spc="0" normalizeH="0" baseline="0" noProof="0">
               <a:ln>
                 <a:noFill/>
               </a:ln>
@@ -12342,7 +11991,7 @@
             </a:lvl9pPr>
           </a:lstStyle>
           <a:p>
-            <a:pPr marL="0" marR="0" lvl="0" indent="0" algn="l" defTabSz="914034" rtl="0" eaLnBrk="1" fontAlgn="base" latinLnBrk="0" hangingPunct="1">
+            <a:pPr marL="0" marR="0" lvl="0" indent="0" algn="l" defTabSz="913765" rtl="0" eaLnBrk="1" fontAlgn="base" latinLnBrk="0" hangingPunct="1">
               <a:lnSpc>
                 <a:spcPct val="100000"/>
               </a:lnSpc>
@@ -12356,10 +12005,9 @@
               <a:buSzTx/>
               <a:buFontTx/>
               <a:buNone/>
-              <a:tabLst/>
               <a:defRPr/>
             </a:pPr>
-            <a:endParaRPr kumimoji="0" lang="zh-CN" altLang="en-US" sz="1799" b="0" i="0" u="none" strike="noStrike" kern="1200" cap="none" spc="0" normalizeH="0" baseline="0" noProof="0">
+            <a:endParaRPr kumimoji="0" lang="zh-CN" altLang="en-US" sz="1800" b="0" i="0" u="none" strike="noStrike" kern="1200" cap="none" spc="0" normalizeH="0" baseline="0" noProof="0">
               <a:ln>
                 <a:noFill/>
               </a:ln>
@@ -12513,7 +12161,7 @@
             </a:lvl9pPr>
           </a:lstStyle>
           <a:p>
-            <a:pPr marL="0" marR="0" lvl="0" indent="0" algn="l" defTabSz="914034" rtl="0" eaLnBrk="1" fontAlgn="base" latinLnBrk="0" hangingPunct="1">
+            <a:pPr marL="0" marR="0" lvl="0" indent="0" algn="l" defTabSz="913765" rtl="0" eaLnBrk="1" fontAlgn="base" latinLnBrk="0" hangingPunct="1">
               <a:lnSpc>
                 <a:spcPct val="100000"/>
               </a:lnSpc>
@@ -12527,10 +12175,9 @@
               <a:buSzTx/>
               <a:buFontTx/>
               <a:buNone/>
-              <a:tabLst/>
               <a:defRPr/>
             </a:pPr>
-            <a:endParaRPr kumimoji="0" lang="zh-CN" altLang="en-US" sz="1799" b="0" i="0" u="none" strike="noStrike" kern="1200" cap="none" spc="0" normalizeH="0" baseline="0" noProof="0">
+            <a:endParaRPr kumimoji="0" lang="zh-CN" altLang="en-US" sz="1800" b="0" i="0" u="none" strike="noStrike" kern="1200" cap="none" spc="0" normalizeH="0" baseline="0" noProof="0">
               <a:ln>
                 <a:noFill/>
               </a:ln>
@@ -12703,7 +12350,7 @@
             </a:lvl9pPr>
           </a:lstStyle>
           <a:p>
-            <a:pPr marL="0" marR="0" lvl="0" indent="0" algn="l" defTabSz="914034" rtl="0" eaLnBrk="1" fontAlgn="base" latinLnBrk="0" hangingPunct="1">
+            <a:pPr marL="0" marR="0" lvl="0" indent="0" algn="l" defTabSz="913765" rtl="0" eaLnBrk="1" fontAlgn="base" latinLnBrk="0" hangingPunct="1">
               <a:lnSpc>
                 <a:spcPct val="150000"/>
               </a:lnSpc>
@@ -12717,11 +12364,10 @@
               <a:buSzTx/>
               <a:buFontTx/>
               <a:buNone/>
-              <a:tabLst/>
               <a:defRPr/>
             </a:pPr>
             <a:r>
-              <a:rPr kumimoji="0" lang="en-US" altLang="zh-CN" sz="2599" b="0" i="0" u="none" strike="noStrike" kern="1200" cap="none" spc="0" normalizeH="0" baseline="0" noProof="0" dirty="0">
+              <a:rPr kumimoji="0" lang="en-US" altLang="zh-CN" sz="2600" b="0" i="0" u="none" strike="noStrike" kern="1200" cap="none" spc="0" normalizeH="0" baseline="0" noProof="0" dirty="0">
                 <a:ln>
                   <a:noFill/>
                 </a:ln>
@@ -12731,14 +12377,14 @@
                 <a:effectLst/>
                 <a:uLnTx/>
                 <a:uFillTx/>
-                <a:latin typeface="微软雅黑" panose="020B0503020204020204" pitchFamily="34" charset="-122"/>
-                <a:ea typeface="微软雅黑" panose="020B0503020204020204" pitchFamily="34" charset="-122"/>
+                <a:latin typeface="微软雅黑" panose="020B0503020204020204" charset="-122"/>
+                <a:ea typeface="微软雅黑" panose="020B0503020204020204" charset="-122"/>
                 <a:cs typeface="+mn-cs"/>
               </a:rPr>
               <a:t>◎</a:t>
             </a:r>
             <a:r>
-              <a:rPr kumimoji="0" lang="zh-CN" altLang="en-US" sz="2599" b="0" i="0" u="none" strike="noStrike" kern="1200" cap="none" spc="0" normalizeH="0" baseline="0" noProof="0" dirty="0">
+              <a:rPr kumimoji="0" lang="zh-CN" altLang="en-US" sz="2600" b="0" i="0" u="none" strike="noStrike" kern="1200" cap="none" spc="0" normalizeH="0" baseline="0" noProof="0" dirty="0">
                 <a:ln>
                   <a:noFill/>
                 </a:ln>
@@ -12748,14 +12394,14 @@
                 <a:effectLst/>
                 <a:uLnTx/>
                 <a:uFillTx/>
-                <a:latin typeface="微软雅黑" panose="020B0503020204020204" pitchFamily="34" charset="-122"/>
-                <a:ea typeface="微软雅黑" panose="020B0503020204020204" pitchFamily="34" charset="-122"/>
+                <a:latin typeface="微软雅黑" panose="020B0503020204020204" charset="-122"/>
+                <a:ea typeface="微软雅黑" panose="020B0503020204020204" charset="-122"/>
                 <a:cs typeface="+mn-cs"/>
               </a:rPr>
               <a:t>小节标题一     </a:t>
             </a:r>
             <a:r>
-              <a:rPr kumimoji="0" lang="en-US" altLang="zh-CN" sz="2599" b="0" i="0" u="none" strike="noStrike" kern="1200" cap="none" spc="0" normalizeH="0" baseline="0" noProof="0" dirty="0">
+              <a:rPr kumimoji="0" lang="en-US" altLang="zh-CN" sz="2600" b="0" i="0" u="none" strike="noStrike" kern="1200" cap="none" spc="0" normalizeH="0" baseline="0" noProof="0" dirty="0">
                 <a:ln>
                   <a:noFill/>
                 </a:ln>
@@ -12765,14 +12411,14 @@
                 <a:effectLst/>
                 <a:uLnTx/>
                 <a:uFillTx/>
-                <a:latin typeface="微软雅黑" panose="020B0503020204020204" pitchFamily="34" charset="-122"/>
-                <a:ea typeface="微软雅黑" panose="020B0503020204020204" pitchFamily="34" charset="-122"/>
+                <a:latin typeface="微软雅黑" panose="020B0503020204020204" charset="-122"/>
+                <a:ea typeface="微软雅黑" panose="020B0503020204020204" charset="-122"/>
                 <a:cs typeface="+mn-cs"/>
               </a:rPr>
               <a:t>◎</a:t>
             </a:r>
             <a:r>
-              <a:rPr kumimoji="0" lang="zh-CN" altLang="en-US" sz="2599" b="0" i="0" u="none" strike="noStrike" kern="1200" cap="none" spc="0" normalizeH="0" baseline="0" noProof="0" dirty="0">
+              <a:rPr kumimoji="0" lang="zh-CN" altLang="en-US" sz="2600" b="0" i="0" u="none" strike="noStrike" kern="1200" cap="none" spc="0" normalizeH="0" baseline="0" noProof="0" dirty="0">
                 <a:ln>
                   <a:noFill/>
                 </a:ln>
@@ -12782,13 +12428,13 @@
                 <a:effectLst/>
                 <a:uLnTx/>
                 <a:uFillTx/>
-                <a:latin typeface="微软雅黑" panose="020B0503020204020204" pitchFamily="34" charset="-122"/>
-                <a:ea typeface="微软雅黑" panose="020B0503020204020204" pitchFamily="34" charset="-122"/>
+                <a:latin typeface="微软雅黑" panose="020B0503020204020204" charset="-122"/>
+                <a:ea typeface="微软雅黑" panose="020B0503020204020204" charset="-122"/>
                 <a:cs typeface="+mn-cs"/>
               </a:rPr>
               <a:t>小节标题二  </a:t>
             </a:r>
-            <a:endParaRPr kumimoji="0" lang="en-US" altLang="zh-CN" sz="2599" b="0" i="0" u="none" strike="noStrike" kern="1200" cap="none" spc="0" normalizeH="0" baseline="0" noProof="0" dirty="0">
+            <a:endParaRPr kumimoji="0" lang="en-US" altLang="zh-CN" sz="2600" b="0" i="0" u="none" strike="noStrike" kern="1200" cap="none" spc="0" normalizeH="0" baseline="0" noProof="0" dirty="0">
               <a:ln>
                 <a:noFill/>
               </a:ln>
@@ -12798,13 +12444,13 @@
               <a:effectLst/>
               <a:uLnTx/>
               <a:uFillTx/>
-              <a:latin typeface="微软雅黑" panose="020B0503020204020204" pitchFamily="34" charset="-122"/>
-              <a:ea typeface="微软雅黑" panose="020B0503020204020204" pitchFamily="34" charset="-122"/>
+              <a:latin typeface="微软雅黑" panose="020B0503020204020204" charset="-122"/>
+              <a:ea typeface="微软雅黑" panose="020B0503020204020204" charset="-122"/>
               <a:cs typeface="+mn-cs"/>
             </a:endParaRPr>
           </a:p>
           <a:p>
-            <a:pPr marL="0" marR="0" lvl="0" indent="0" algn="l" defTabSz="914034" rtl="0" eaLnBrk="1" fontAlgn="base" latinLnBrk="0" hangingPunct="1">
+            <a:pPr marL="0" marR="0" lvl="0" indent="0" algn="l" defTabSz="913765" rtl="0" eaLnBrk="1" fontAlgn="base" latinLnBrk="0" hangingPunct="1">
               <a:lnSpc>
                 <a:spcPct val="150000"/>
               </a:lnSpc>
@@ -12818,11 +12464,10 @@
               <a:buSzTx/>
               <a:buFontTx/>
               <a:buNone/>
-              <a:tabLst/>
               <a:defRPr/>
             </a:pPr>
             <a:r>
-              <a:rPr kumimoji="0" lang="en-US" altLang="zh-CN" sz="2599" b="0" i="0" u="none" strike="noStrike" kern="1200" cap="none" spc="0" normalizeH="0" baseline="0" noProof="0" dirty="0">
+              <a:rPr kumimoji="0" lang="en-US" altLang="zh-CN" sz="2600" b="0" i="0" u="none" strike="noStrike" kern="1200" cap="none" spc="0" normalizeH="0" baseline="0" noProof="0" dirty="0">
                 <a:ln>
                   <a:noFill/>
                 </a:ln>
@@ -12832,14 +12477,14 @@
                 <a:effectLst/>
                 <a:uLnTx/>
                 <a:uFillTx/>
-                <a:latin typeface="微软雅黑" panose="020B0503020204020204" pitchFamily="34" charset="-122"/>
-                <a:ea typeface="微软雅黑" panose="020B0503020204020204" pitchFamily="34" charset="-122"/>
+                <a:latin typeface="微软雅黑" panose="020B0503020204020204" charset="-122"/>
+                <a:ea typeface="微软雅黑" panose="020B0503020204020204" charset="-122"/>
                 <a:cs typeface="+mn-cs"/>
               </a:rPr>
               <a:t>◎</a:t>
             </a:r>
             <a:r>
-              <a:rPr kumimoji="0" lang="zh-CN" altLang="en-US" sz="2599" b="0" i="0" u="none" strike="noStrike" kern="1200" cap="none" spc="0" normalizeH="0" baseline="0" noProof="0" dirty="0">
+              <a:rPr kumimoji="0" lang="zh-CN" altLang="en-US" sz="2600" b="0" i="0" u="none" strike="noStrike" kern="1200" cap="none" spc="0" normalizeH="0" baseline="0" noProof="0" dirty="0">
                 <a:ln>
                   <a:noFill/>
                 </a:ln>
@@ -12849,14 +12494,14 @@
                 <a:effectLst/>
                 <a:uLnTx/>
                 <a:uFillTx/>
-                <a:latin typeface="微软雅黑" panose="020B0503020204020204" pitchFamily="34" charset="-122"/>
-                <a:ea typeface="微软雅黑" panose="020B0503020204020204" pitchFamily="34" charset="-122"/>
+                <a:latin typeface="微软雅黑" panose="020B0503020204020204" charset="-122"/>
+                <a:ea typeface="微软雅黑" panose="020B0503020204020204" charset="-122"/>
                 <a:cs typeface="+mn-cs"/>
               </a:rPr>
               <a:t>小节标题三     </a:t>
             </a:r>
             <a:r>
-              <a:rPr kumimoji="0" lang="en-US" altLang="zh-CN" sz="2599" b="0" i="0" u="none" strike="noStrike" kern="1200" cap="none" spc="0" normalizeH="0" baseline="0" noProof="0" dirty="0">
+              <a:rPr kumimoji="0" lang="en-US" altLang="zh-CN" sz="2600" b="0" i="0" u="none" strike="noStrike" kern="1200" cap="none" spc="0" normalizeH="0" baseline="0" noProof="0" dirty="0">
                 <a:ln>
                   <a:noFill/>
                 </a:ln>
@@ -12866,14 +12511,14 @@
                 <a:effectLst/>
                 <a:uLnTx/>
                 <a:uFillTx/>
-                <a:latin typeface="微软雅黑" panose="020B0503020204020204" pitchFamily="34" charset="-122"/>
-                <a:ea typeface="微软雅黑" panose="020B0503020204020204" pitchFamily="34" charset="-122"/>
+                <a:latin typeface="微软雅黑" panose="020B0503020204020204" charset="-122"/>
+                <a:ea typeface="微软雅黑" panose="020B0503020204020204" charset="-122"/>
                 <a:cs typeface="+mn-cs"/>
               </a:rPr>
               <a:t>◎</a:t>
             </a:r>
             <a:r>
-              <a:rPr kumimoji="0" lang="zh-CN" altLang="en-US" sz="2599" b="0" i="0" u="none" strike="noStrike" kern="1200" cap="none" spc="0" normalizeH="0" baseline="0" noProof="0" dirty="0">
+              <a:rPr kumimoji="0" lang="zh-CN" altLang="en-US" sz="2600" b="0" i="0" u="none" strike="noStrike" kern="1200" cap="none" spc="0" normalizeH="0" baseline="0" noProof="0" dirty="0">
                 <a:ln>
                   <a:noFill/>
                 </a:ln>
@@ -12883,12 +12528,26 @@
                 <a:effectLst/>
                 <a:uLnTx/>
                 <a:uFillTx/>
-                <a:latin typeface="微软雅黑" panose="020B0503020204020204" pitchFamily="34" charset="-122"/>
-                <a:ea typeface="微软雅黑" panose="020B0503020204020204" pitchFamily="34" charset="-122"/>
+                <a:latin typeface="微软雅黑" panose="020B0503020204020204" charset="-122"/>
+                <a:ea typeface="微软雅黑" panose="020B0503020204020204" charset="-122"/>
                 <a:cs typeface="+mn-cs"/>
               </a:rPr>
               <a:t>小节标题四</a:t>
             </a:r>
+            <a:endParaRPr kumimoji="0" lang="zh-CN" altLang="en-US" sz="2600" b="0" i="0" u="none" strike="noStrike" kern="1200" cap="none" spc="0" normalizeH="0" baseline="0" noProof="0" dirty="0">
+              <a:ln>
+                <a:noFill/>
+              </a:ln>
+              <a:solidFill>
+                <a:srgbClr val="FFFFFF"/>
+              </a:solidFill>
+              <a:effectLst/>
+              <a:uLnTx/>
+              <a:uFillTx/>
+              <a:latin typeface="微软雅黑" panose="020B0503020204020204" charset="-122"/>
+              <a:ea typeface="微软雅黑" panose="020B0503020204020204" charset="-122"/>
+              <a:cs typeface="+mn-cs"/>
+            </a:endParaRPr>
           </a:p>
         </p:txBody>
       </p:sp>
@@ -13048,7 +12707,7 @@
             </a:lvl9pPr>
           </a:lstStyle>
           <a:p>
-            <a:pPr marL="0" marR="0" lvl="0" indent="0" algn="l" defTabSz="914034" rtl="0" eaLnBrk="1" fontAlgn="base" latinLnBrk="0" hangingPunct="1">
+            <a:pPr marL="0" marR="0" lvl="0" indent="0" algn="l" defTabSz="913765" rtl="0" eaLnBrk="1" fontAlgn="base" latinLnBrk="0" hangingPunct="1">
               <a:lnSpc>
                 <a:spcPct val="100000"/>
               </a:lnSpc>
@@ -13062,11 +12721,10 @@
               <a:buSzTx/>
               <a:buFontTx/>
               <a:buNone/>
-              <a:tabLst/>
               <a:defRPr/>
             </a:pPr>
             <a:r>
-              <a:rPr kumimoji="0" lang="zh-CN" altLang="en-US" sz="3998" b="1" i="0" u="none" strike="noStrike" kern="1200" cap="none" spc="0" normalizeH="0" baseline="0" noProof="0" dirty="0">
+              <a:rPr kumimoji="0" lang="zh-CN" altLang="en-US" sz="4000" b="1" i="0" u="none" strike="noStrike" kern="1200" cap="none" spc="0" normalizeH="0" baseline="0" noProof="0" dirty="0">
                 <a:ln>
                   <a:noFill/>
                 </a:ln>
@@ -13076,12 +12734,26 @@
                 <a:effectLst/>
                 <a:uLnTx/>
                 <a:uFillTx/>
-                <a:latin typeface="微软雅黑" panose="020B0503020204020204" pitchFamily="34" charset="-122"/>
-                <a:ea typeface="微软雅黑" panose="020B0503020204020204" pitchFamily="34" charset="-122"/>
+                <a:latin typeface="微软雅黑" panose="020B0503020204020204" charset="-122"/>
+                <a:ea typeface="微软雅黑" panose="020B0503020204020204" charset="-122"/>
                 <a:cs typeface="+mn-cs"/>
               </a:rPr>
               <a:t>第一部分标题</a:t>
             </a:r>
+            <a:endParaRPr kumimoji="0" lang="zh-CN" altLang="en-US" sz="4000" b="1" i="0" u="none" strike="noStrike" kern="1200" cap="none" spc="0" normalizeH="0" baseline="0" noProof="0" dirty="0">
+              <a:ln>
+                <a:noFill/>
+              </a:ln>
+              <a:solidFill>
+                <a:srgbClr val="FDCB34"/>
+              </a:solidFill>
+              <a:effectLst/>
+              <a:uLnTx/>
+              <a:uFillTx/>
+              <a:latin typeface="微软雅黑" panose="020B0503020204020204" charset="-122"/>
+              <a:ea typeface="微软雅黑" panose="020B0503020204020204" charset="-122"/>
+              <a:cs typeface="+mn-cs"/>
+            </a:endParaRPr>
           </a:p>
         </p:txBody>
       </p:sp>
@@ -13241,7 +12913,7 @@
             </a:lvl9pPr>
           </a:lstStyle>
           <a:p>
-            <a:pPr marL="0" marR="0" lvl="0" indent="0" algn="l" defTabSz="914034" rtl="0" eaLnBrk="1" fontAlgn="base" latinLnBrk="0" hangingPunct="1">
+            <a:pPr marL="0" marR="0" lvl="0" indent="0" algn="l" defTabSz="913765" rtl="0" eaLnBrk="1" fontAlgn="base" latinLnBrk="0" hangingPunct="1">
               <a:lnSpc>
                 <a:spcPct val="100000"/>
               </a:lnSpc>
@@ -13255,7 +12927,6 @@
               <a:buSzTx/>
               <a:buFontTx/>
               <a:buNone/>
-              <a:tabLst/>
               <a:defRPr/>
             </a:pPr>
             <a:r>
@@ -13269,8 +12940,8 @@
                 <a:effectLst/>
                 <a:uLnTx/>
                 <a:uFillTx/>
-                <a:latin typeface="微软雅黑" panose="020B0503020204020204" pitchFamily="34" charset="-122"/>
-                <a:ea typeface="微软雅黑" panose="020B0503020204020204" pitchFamily="34" charset="-122"/>
+                <a:latin typeface="微软雅黑" panose="020B0503020204020204" charset="-122"/>
+                <a:ea typeface="微软雅黑" panose="020B0503020204020204" charset="-122"/>
                 <a:cs typeface="+mn-cs"/>
               </a:rPr>
               <a:t>01</a:t>
@@ -13285,8 +12956,8 @@
               <a:effectLst/>
               <a:uLnTx/>
               <a:uFillTx/>
-              <a:latin typeface="微软雅黑" panose="020B0503020204020204" pitchFamily="34" charset="-122"/>
-              <a:ea typeface="微软雅黑" panose="020B0503020204020204" pitchFamily="34" charset="-122"/>
+              <a:latin typeface="微软雅黑" panose="020B0503020204020204" charset="-122"/>
+              <a:ea typeface="微软雅黑" panose="020B0503020204020204" charset="-122"/>
               <a:cs typeface="+mn-cs"/>
             </a:endParaRPr>
           </a:p>
@@ -13301,13 +12972,7 @@
           <p:nvPr/>
         </p:nvPicPr>
         <p:blipFill>
-          <a:blip r:embed="rId4" cstate="screen">
-            <a:extLst>
-              <a:ext uri="{28A0092B-C50C-407E-A947-70E740481C1C}">
-                <a14:useLocalDpi xmlns:a14="http://schemas.microsoft.com/office/drawing/2010/main"/>
-              </a:ext>
-            </a:extLst>
-          </a:blip>
+          <a:blip r:embed="rId2" cstate="screen"/>
           <a:srcRect/>
           <a:stretch>
             <a:fillRect/>
@@ -13347,22 +13012,17 @@
         </p:spPr>
       </p:pic>
     </p:spTree>
-    <p:extLst>
-      <p:ext uri="{BB962C8B-B14F-4D97-AF65-F5344CB8AC3E}">
-        <p14:creationId xmlns:p14="http://schemas.microsoft.com/office/powerpoint/2010/main" val="599426952"/>
-      </p:ext>
-    </p:extLst>
   </p:cSld>
   <p:clrMapOvr>
     <a:masterClrMapping/>
   </p:clrMapOvr>
-  <mc:AlternateContent xmlns:mc="http://schemas.openxmlformats.org/markup-compatibility/2006" xmlns:p14="http://schemas.microsoft.com/office/powerpoint/2010/main">
-    <mc:Choice Requires="p14">
+  <mc:AlternateContent xmlns:mc="http://schemas.openxmlformats.org/markup-compatibility/2006">
+    <mc:Choice xmlns:p14="http://schemas.microsoft.com/office/powerpoint/2010/main" Requires="p14">
       <p:transition p14:dur="100">
         <p:cut/>
       </p:transition>
     </mc:Choice>
-    <mc:Fallback xmlns="">
+    <mc:Fallback>
       <p:transition>
         <p:cut/>
       </p:transition>
@@ -13377,7 +13037,7 @@
               <p:cTn id="2" dur="indefinite" nodeType="mainSeq">
                 <p:childTnLst>
                   <p:par>
-                    <p:cTn id="3" fill="hold" nodeType="clickPar">
+                    <p:cTn id="3" fill="hold">
                       <p:stCondLst>
                         <p:cond delay="indefinite"/>
                         <p:cond evt="onBegin" delay="0">
@@ -13386,7 +13046,7 @@
                       </p:stCondLst>
                       <p:childTnLst>
                         <p:par>
-                          <p:cTn id="4" fill="hold" nodeType="withGroup">
+                          <p:cTn id="4" fill="hold">
                             <p:stCondLst>
                               <p:cond delay="0"/>
                             </p:stCondLst>
@@ -13430,7 +13090,7 @@
                           </p:cTn>
                         </p:par>
                         <p:par>
-                          <p:cTn id="8" fill="hold" nodeType="afterGroup">
+                          <p:cTn id="8" fill="hold">
                             <p:stCondLst>
                               <p:cond delay="500"/>
                             </p:stCondLst>
@@ -13474,9 +13134,9 @@
                           </p:cTn>
                         </p:par>
                         <p:par>
-                          <p:cTn id="12" fill="hold" nodeType="afterGroup">
+                          <p:cTn id="12" fill="hold">
                             <p:stCondLst>
-                              <p:cond delay="800"/>
+                              <p:cond delay="1000"/>
                             </p:stCondLst>
                             <p:childTnLst>
                               <p:par>
@@ -13518,9 +13178,9 @@
                           </p:cTn>
                         </p:par>
                         <p:par>
-                          <p:cTn id="16" fill="hold" nodeType="afterGroup">
+                          <p:cTn id="16" fill="hold">
                             <p:stCondLst>
-                              <p:cond delay="1300"/>
+                              <p:cond delay="1500"/>
                             </p:stCondLst>
                             <p:childTnLst>
                               <p:par>
@@ -13554,9 +13214,9 @@
                           </p:cTn>
                         </p:par>
                         <p:par>
-                          <p:cTn id="19" fill="hold" nodeType="afterGroup">
+                          <p:cTn id="19" fill="hold">
                             <p:stCondLst>
-                              <p:cond delay="1300"/>
+                              <p:cond delay="1500"/>
                             </p:stCondLst>
                             <p:childTnLst>
                               <p:par>
@@ -13712,11 +13372,6 @@
         </p:txBody>
       </p:sp>
     </p:spTree>
-    <p:extLst>
-      <p:ext uri="{BB962C8B-B14F-4D97-AF65-F5344CB8AC3E}">
-        <p14:creationId xmlns:p14="http://schemas.microsoft.com/office/powerpoint/2010/main" val="1041364281"/>
-      </p:ext>
-    </p:extLst>
   </p:cSld>
   <p:clrMapOvr>
     <a:masterClrMapping/>
@@ -13749,11 +13404,6 @@
           </p:cNvGraphicFramePr>
           <p:nvPr>
             <p:ph idx="1"/>
-            <p:extLst>
-              <p:ext uri="{D42A27DB-BD31-4B8C-83A1-F6EECF244321}">
-                <p14:modId xmlns:p14="http://schemas.microsoft.com/office/powerpoint/2010/main" val="2842226209"/>
-              </p:ext>
-            </p:extLst>
           </p:nvPr>
         </p:nvGraphicFramePr>
         <p:xfrm>
@@ -13762,7 +13412,7 @@
         </p:xfrm>
         <a:graphic>
           <a:graphicData uri="http://schemas.openxmlformats.org/drawingml/2006/chart">
-            <c:chart xmlns:c="http://schemas.openxmlformats.org/drawingml/2006/chart" xmlns:r="http://schemas.openxmlformats.org/officeDocument/2006/relationships" r:id="rId2"/>
+            <c:chart xmlns:c="http://schemas.openxmlformats.org/drawingml/2006/chart" xmlns:r="http://schemas.openxmlformats.org/officeDocument/2006/relationships" r:id="rId1"/>
           </a:graphicData>
         </a:graphic>
       </p:graphicFrame>
@@ -13786,11 +13436,6 @@
         </p:txBody>
       </p:sp>
     </p:spTree>
-    <p:extLst>
-      <p:ext uri="{BB962C8B-B14F-4D97-AF65-F5344CB8AC3E}">
-        <p14:creationId xmlns:p14="http://schemas.microsoft.com/office/powerpoint/2010/main" val="3988470980"/>
-      </p:ext>
-    </p:extLst>
   </p:cSld>
   <p:clrMapOvr>
     <a:masterClrMapping/>
@@ -13804,13 +13449,8 @@
     <p:bg>
       <p:bgPr>
         <a:blipFill dpi="0" rotWithShape="1">
-          <a:blip r:embed="rId3" cstate="screen">
+          <a:blip r:embed="rId1" cstate="screen">
             <a:lum/>
-            <a:extLst>
-              <a:ext uri="{28A0092B-C50C-407E-A947-70E740481C1C}">
-                <a14:useLocalDpi xmlns:a14="http://schemas.microsoft.com/office/drawing/2010/main"/>
-              </a:ext>
-            </a:extLst>
           </a:blip>
           <a:srcRect/>
           <a:stretch>
@@ -13843,13 +13483,7 @@
           <p:nvPr/>
         </p:nvPicPr>
         <p:blipFill>
-          <a:blip r:embed="rId4" cstate="screen">
-            <a:extLst>
-              <a:ext uri="{28A0092B-C50C-407E-A947-70E740481C1C}">
-                <a14:useLocalDpi xmlns:a14="http://schemas.microsoft.com/office/drawing/2010/main"/>
-              </a:ext>
-            </a:extLst>
-          </a:blip>
+          <a:blip r:embed="rId2" cstate="screen"/>
           <a:stretch>
             <a:fillRect/>
           </a:stretch>
@@ -13873,13 +13507,7 @@
           <p:nvPr/>
         </p:nvPicPr>
         <p:blipFill>
-          <a:blip r:embed="rId5">
-            <a:extLst>
-              <a:ext uri="{28A0092B-C50C-407E-A947-70E740481C1C}">
-                <a14:useLocalDpi xmlns:a14="http://schemas.microsoft.com/office/drawing/2010/main"/>
-              </a:ext>
-            </a:extLst>
-          </a:blip>
+          <a:blip r:embed="rId3"/>
           <a:stretch>
             <a:fillRect/>
           </a:stretch>
@@ -13895,28 +13523,30 @@
         </p:spPr>
       </p:pic>
     </p:spTree>
-    <p:extLst>
-      <p:ext uri="{BB962C8B-B14F-4D97-AF65-F5344CB8AC3E}">
-        <p14:creationId xmlns:p14="http://schemas.microsoft.com/office/powerpoint/2010/main" val="3960416872"/>
-      </p:ext>
-    </p:extLst>
   </p:cSld>
   <p:clrMapOvr>
     <a:masterClrMapping/>
   </p:clrMapOvr>
-  <mc:AlternateContent xmlns:mc="http://schemas.openxmlformats.org/markup-compatibility/2006" xmlns:p14="http://schemas.microsoft.com/office/powerpoint/2010/main">
-    <mc:Choice Requires="p14">
+  <mc:AlternateContent xmlns:mc="http://schemas.openxmlformats.org/markup-compatibility/2006">
+    <mc:Choice xmlns:p14="http://schemas.microsoft.com/office/powerpoint/2010/main" Requires="p14">
       <p:transition spd="slow" p14:dur="1500">
         <p:split orient="vert"/>
       </p:transition>
     </mc:Choice>
-    <mc:Fallback xmlns="">
+    <mc:Fallback>
       <p:transition spd="slow">
         <p:split orient="vert"/>
       </p:transition>
     </mc:Fallback>
   </mc:AlternateContent>
 </p:sld>
+</file>
+
+<file path=ppt/tags/tag1.xml><?xml version="1.0" encoding="utf-8"?>
+<p:tagLst xmlns:p="http://schemas.openxmlformats.org/presentationml/2006/main">
+  <p:tag name="KSO_WPP_MARK_KEY" val="ecf43ead-f3ac-4a07-b223-119dfe738a48"/>
+  <p:tag name="COMMONDATA" val="eyJoZGlkIjoiNWRiN2EzOTIwNTFkMWRjYjlhM2M2MjEwMTAzOTAyMTAifQ=="/>
+</p:tagLst>
 </file>
 
 <file path=ppt/theme/theme1.xml><?xml version="1.0" encoding="utf-8"?>
@@ -14110,8 +13740,6 @@
       </a:bgFillStyleLst>
     </a:fmtScheme>
   </a:themeElements>
-  <a:objectDefaults/>
-  <a:extraClrSchemeLst/>
   <a:extLst>
     <a:ext uri="{05A4C25C-085E-4340-85A3-A5531E510DB2}">
       <thm15:themeFamily xmlns:thm15="http://schemas.microsoft.com/office/thememl/2012/main" name="Office Theme" id="{62F939B6-93AF-4DB8-9C6B-D6C7DFDC589F}" vid="{4A3C46E8-61CC-4603-A589-7422A47A8E4A}"/>
@@ -14163,7 +13791,7 @@
     </a:clrScheme>
     <a:fontScheme name="Office">
       <a:majorFont>
-        <a:latin typeface="等线 Light" panose="020F0302020204030204"/>
+        <a:latin typeface="等线 Light"/>
         <a:ea typeface=""/>
         <a:cs typeface=""/>
         <a:font script="Jpan" typeface="游ゴシック Light"/>
@@ -14198,7 +13826,7 @@
         <a:font script="Geor" typeface="Sylfaen"/>
       </a:majorFont>
       <a:minorFont>
-        <a:latin typeface="等线" panose="020F0502020204030204"/>
+        <a:latin typeface="等线"/>
         <a:ea typeface=""/>
         <a:cs typeface=""/>
         <a:font script="Jpan" typeface="游ゴシック"/>
@@ -14371,8 +13999,6 @@
       </a:bgFillStyleLst>
     </a:fmtScheme>
   </a:themeElements>
-  <a:objectDefaults/>
-  <a:extraClrSchemeLst/>
   <a:extLst>
     <a:ext uri="{05A4C25C-085E-4340-85A3-A5531E510DB2}">
       <thm15:themeFamily xmlns:thm15="http://schemas.microsoft.com/office/thememl/2012/main" name="Office Theme" id="{62F939B6-93AF-4DB8-9C6B-D6C7DFDC589F}" vid="{4A3C46E8-61CC-4603-A589-7422A47A8E4A}"/>

</xml_diff>